<commit_message>
adding in some nullclines
</commit_message>
<xml_diff>
--- a/07_06_22_day2_dynamical_time_series/slides/day2_introduction.pptx
+++ b/07_06_22_day2_dynamical_time_series/slides/day2_introduction.pptx
@@ -5,7 +5,7 @@
     <p:sldMasterId id="2147483648" r:id="rId1"/>
   </p:sldMasterIdLst>
   <p:notesMasterIdLst>
-    <p:notesMasterId r:id="rId26"/>
+    <p:notesMasterId r:id="rId27"/>
   </p:notesMasterIdLst>
   <p:sldIdLst>
     <p:sldId id="256" r:id="rId2"/>
@@ -21,17 +21,18 @@
     <p:sldId id="258" r:id="rId12"/>
     <p:sldId id="270" r:id="rId13"/>
     <p:sldId id="272" r:id="rId14"/>
-    <p:sldId id="266" r:id="rId15"/>
-    <p:sldId id="271" r:id="rId16"/>
-    <p:sldId id="273" r:id="rId17"/>
-    <p:sldId id="276" r:id="rId18"/>
-    <p:sldId id="275" r:id="rId19"/>
-    <p:sldId id="277" r:id="rId20"/>
-    <p:sldId id="274" r:id="rId21"/>
-    <p:sldId id="278" r:id="rId22"/>
-    <p:sldId id="279" r:id="rId23"/>
-    <p:sldId id="280" r:id="rId24"/>
-    <p:sldId id="281" r:id="rId25"/>
+    <p:sldId id="282" r:id="rId15"/>
+    <p:sldId id="266" r:id="rId16"/>
+    <p:sldId id="271" r:id="rId17"/>
+    <p:sldId id="273" r:id="rId18"/>
+    <p:sldId id="276" r:id="rId19"/>
+    <p:sldId id="275" r:id="rId20"/>
+    <p:sldId id="277" r:id="rId21"/>
+    <p:sldId id="274" r:id="rId22"/>
+    <p:sldId id="278" r:id="rId23"/>
+    <p:sldId id="279" r:id="rId24"/>
+    <p:sldId id="280" r:id="rId25"/>
+    <p:sldId id="281" r:id="rId26"/>
   </p:sldIdLst>
   <p:sldSz cx="12192000" cy="6858000"/>
   <p:notesSz cx="6858000" cy="9144000"/>
@@ -560,7 +561,7 @@
           <a:p>
             <a:fld id="{589CCC7D-D5B9-4873-8AD0-0076A6B30CA2}" type="slidenum">
               <a:rPr lang="en-US" smtClean="0"/>
-              <a:t>21</a:t>
+              <a:t>22</a:t>
             </a:fld>
             <a:endParaRPr lang="en-US"/>
           </a:p>
@@ -3860,12 +3861,8 @@
           </a:p>
           <a:p>
             <a:r>
-              <a:rPr lang="en-US"/>
-              <a:t>July 6, </a:t>
-            </a:r>
-            <a:r>
               <a:rPr lang="en-US" dirty="0"/>
-              <a:t>2022</a:t>
+              <a:t>July 6, 2022</a:t>
             </a:r>
           </a:p>
         </p:txBody>
@@ -10435,6 +10432,161 @@
           <a:chExt cx="0" cy="0"/>
         </a:xfrm>
       </p:grpSpPr>
+      <p:sp>
+        <p:nvSpPr>
+          <p:cNvPr id="2" name="TextBox 1">
+            <a:extLst>
+              <a:ext uri="{FF2B5EF4-FFF2-40B4-BE49-F238E27FC236}">
+                <a16:creationId xmlns:a16="http://schemas.microsoft.com/office/drawing/2014/main" id="{A78BC80A-3ADB-2794-DBE0-36F038308F63}"/>
+              </a:ext>
+            </a:extLst>
+          </p:cNvPr>
+          <p:cNvSpPr txBox="1"/>
+          <p:nvPr/>
+        </p:nvSpPr>
+        <p:spPr>
+          <a:xfrm>
+            <a:off x="211973" y="332508"/>
+            <a:ext cx="11768051" cy="461665"/>
+          </a:xfrm>
+          <a:prstGeom prst="rect">
+            <a:avLst/>
+          </a:prstGeom>
+          <a:noFill/>
+        </p:spPr>
+        <p:txBody>
+          <a:bodyPr wrap="square" rtlCol="0">
+            <a:spAutoFit/>
+          </a:bodyPr>
+          <a:lstStyle/>
+          <a:p>
+            <a:r>
+              <a:rPr lang="en-US" sz="2400" dirty="0"/>
+              <a:t>What is my neuron doing and why?</a:t>
+            </a:r>
+          </a:p>
+        </p:txBody>
+      </p:sp>
+      <p:sp>
+        <p:nvSpPr>
+          <p:cNvPr id="5" name="TextBox 4">
+            <a:extLst>
+              <a:ext uri="{FF2B5EF4-FFF2-40B4-BE49-F238E27FC236}">
+                <a16:creationId xmlns:a16="http://schemas.microsoft.com/office/drawing/2014/main" id="{87ABEBDB-9A4C-E670-584F-CDAEECEA226B}"/>
+              </a:ext>
+            </a:extLst>
+          </p:cNvPr>
+          <p:cNvSpPr txBox="1"/>
+          <p:nvPr/>
+        </p:nvSpPr>
+        <p:spPr>
+          <a:xfrm>
+            <a:off x="478945" y="1467852"/>
+            <a:ext cx="4848726" cy="2308324"/>
+          </a:xfrm>
+          <a:prstGeom prst="rect">
+            <a:avLst/>
+          </a:prstGeom>
+          <a:noFill/>
+        </p:spPr>
+        <p:txBody>
+          <a:bodyPr wrap="square" rtlCol="0">
+            <a:spAutoFit/>
+          </a:bodyPr>
+          <a:lstStyle/>
+          <a:p>
+            <a:r>
+              <a:rPr lang="en-US" dirty="0"/>
+              <a:t>We won’t get into this today (unless you insist), but there are some excellent methods in dynamical systems for visualizing these models and understanding their behavior.</a:t>
+            </a:r>
+          </a:p>
+          <a:p>
+            <a:endParaRPr lang="en-US" dirty="0"/>
+          </a:p>
+          <a:p>
+            <a:r>
+              <a:rPr lang="en-US" dirty="0"/>
+              <a:t>If you’re interested, check out the bonus notebook “</a:t>
+            </a:r>
+            <a:r>
+              <a:rPr lang="en-US" dirty="0" err="1"/>
+              <a:t>neural_model_simulation</a:t>
+            </a:r>
+            <a:r>
+              <a:rPr lang="en-US" dirty="0"/>
+              <a:t>” on the Morris-</a:t>
+            </a:r>
+            <a:r>
+              <a:rPr lang="en-US" dirty="0" err="1"/>
+              <a:t>Lecar</a:t>
+            </a:r>
+            <a:r>
+              <a:rPr lang="en-US" dirty="0"/>
+              <a:t> model! </a:t>
+            </a:r>
+          </a:p>
+        </p:txBody>
+      </p:sp>
+      <p:pic>
+        <p:nvPicPr>
+          <p:cNvPr id="7" name="Picture 6">
+            <a:extLst>
+              <a:ext uri="{FF2B5EF4-FFF2-40B4-BE49-F238E27FC236}">
+                <a16:creationId xmlns:a16="http://schemas.microsoft.com/office/drawing/2014/main" id="{D3146858-AF53-24DF-5958-AA75F33029E2}"/>
+              </a:ext>
+            </a:extLst>
+          </p:cNvPr>
+          <p:cNvPicPr>
+            <a:picLocks noChangeAspect="1"/>
+          </p:cNvPicPr>
+          <p:nvPr/>
+        </p:nvPicPr>
+        <p:blipFill>
+          <a:blip r:embed="rId2"/>
+          <a:stretch>
+            <a:fillRect/>
+          </a:stretch>
+        </p:blipFill>
+        <p:spPr>
+          <a:xfrm>
+            <a:off x="6268452" y="611589"/>
+            <a:ext cx="5058736" cy="5913903"/>
+          </a:xfrm>
+          <a:prstGeom prst="rect">
+            <a:avLst/>
+          </a:prstGeom>
+        </p:spPr>
+      </p:pic>
+    </p:spTree>
+    <p:extLst>
+      <p:ext uri="{BB962C8B-B14F-4D97-AF65-F5344CB8AC3E}">
+        <p14:creationId xmlns:p14="http://schemas.microsoft.com/office/powerpoint/2010/main" val="1682500369"/>
+      </p:ext>
+    </p:extLst>
+  </p:cSld>
+  <p:clrMapOvr>
+    <a:masterClrMapping/>
+  </p:clrMapOvr>
+</p:sld>
+</file>
+
+<file path=ppt/slides/slide15.xml><?xml version="1.0" encoding="utf-8"?>
+<p:sld xmlns:a="http://schemas.openxmlformats.org/drawingml/2006/main" xmlns:r="http://schemas.openxmlformats.org/officeDocument/2006/relationships" xmlns:p="http://schemas.openxmlformats.org/presentationml/2006/main">
+  <p:cSld>
+    <p:spTree>
+      <p:nvGrpSpPr>
+        <p:cNvPr id="1" name=""/>
+        <p:cNvGrpSpPr/>
+        <p:nvPr/>
+      </p:nvGrpSpPr>
+      <p:grpSpPr>
+        <a:xfrm>
+          <a:off x="0" y="0"/>
+          <a:ext cx="0" cy="0"/>
+          <a:chOff x="0" y="0"/>
+          <a:chExt cx="0" cy="0"/>
+        </a:xfrm>
+      </p:grpSpPr>
       <p:grpSp>
         <p:nvGrpSpPr>
           <p:cNvPr id="2" name="Group 1">
@@ -11088,7 +11240,7 @@
 </p:sld>
 </file>
 
-<file path=ppt/slides/slide15.xml><?xml version="1.0" encoding="utf-8"?>
+<file path=ppt/slides/slide16.xml><?xml version="1.0" encoding="utf-8"?>
 <p:sld xmlns:a="http://schemas.openxmlformats.org/drawingml/2006/main" xmlns:r="http://schemas.openxmlformats.org/officeDocument/2006/relationships" xmlns:p="http://schemas.openxmlformats.org/presentationml/2006/main">
   <p:cSld>
     <p:spTree>
@@ -13230,7 +13382,7 @@
 </p:sld>
 </file>
 
-<file path=ppt/slides/slide16.xml><?xml version="1.0" encoding="utf-8"?>
+<file path=ppt/slides/slide17.xml><?xml version="1.0" encoding="utf-8"?>
 <p:sld xmlns:a="http://schemas.openxmlformats.org/drawingml/2006/main" xmlns:r="http://schemas.openxmlformats.org/officeDocument/2006/relationships" xmlns:p="http://schemas.openxmlformats.org/presentationml/2006/main">
   <p:cSld>
     <p:spTree>
@@ -14229,7 +14381,7 @@
 </p:sld>
 </file>
 
-<file path=ppt/slides/slide17.xml><?xml version="1.0" encoding="utf-8"?>
+<file path=ppt/slides/slide18.xml><?xml version="1.0" encoding="utf-8"?>
 <p:sld xmlns:a="http://schemas.openxmlformats.org/drawingml/2006/main" xmlns:r="http://schemas.openxmlformats.org/officeDocument/2006/relationships" xmlns:p="http://schemas.openxmlformats.org/presentationml/2006/main">
   <p:cSld>
     <p:spTree>
@@ -14503,7 +14655,7 @@
 </p:sld>
 </file>
 
-<file path=ppt/slides/slide18.xml><?xml version="1.0" encoding="utf-8"?>
+<file path=ppt/slides/slide19.xml><?xml version="1.0" encoding="utf-8"?>
 <p:sld xmlns:a="http://schemas.openxmlformats.org/drawingml/2006/main" xmlns:r="http://schemas.openxmlformats.org/officeDocument/2006/relationships" xmlns:p="http://schemas.openxmlformats.org/presentationml/2006/main">
   <p:cSld>
     <p:spTree>
@@ -15382,1018 +15534,6 @@
     </p:tnLst>
     <p:bldLst>
       <p:bldP spid="5" grpId="0"/>
-    </p:bldLst>
-  </p:timing>
-</p:sld>
-</file>
-
-<file path=ppt/slides/slide19.xml><?xml version="1.0" encoding="utf-8"?>
-<p:sld xmlns:a="http://schemas.openxmlformats.org/drawingml/2006/main" xmlns:r="http://schemas.openxmlformats.org/officeDocument/2006/relationships" xmlns:p="http://schemas.openxmlformats.org/presentationml/2006/main">
-  <p:cSld>
-    <p:spTree>
-      <p:nvGrpSpPr>
-        <p:cNvPr id="1" name=""/>
-        <p:cNvGrpSpPr/>
-        <p:nvPr/>
-      </p:nvGrpSpPr>
-      <p:grpSpPr>
-        <a:xfrm>
-          <a:off x="0" y="0"/>
-          <a:ext cx="0" cy="0"/>
-          <a:chOff x="0" y="0"/>
-          <a:chExt cx="0" cy="0"/>
-        </a:xfrm>
-      </p:grpSpPr>
-      <p:sp>
-        <p:nvSpPr>
-          <p:cNvPr id="2" name="TextBox 1">
-            <a:extLst>
-              <a:ext uri="{FF2B5EF4-FFF2-40B4-BE49-F238E27FC236}">
-                <a16:creationId xmlns:a16="http://schemas.microsoft.com/office/drawing/2014/main" id="{1D404F9D-E56C-A2E2-F0D4-262A3602E94A}"/>
-              </a:ext>
-            </a:extLst>
-          </p:cNvPr>
-          <p:cNvSpPr txBox="1"/>
-          <p:nvPr/>
-        </p:nvSpPr>
-        <p:spPr>
-          <a:xfrm>
-            <a:off x="211973" y="332508"/>
-            <a:ext cx="11768051" cy="1200329"/>
-          </a:xfrm>
-          <a:prstGeom prst="rect">
-            <a:avLst/>
-          </a:prstGeom>
-          <a:noFill/>
-        </p:spPr>
-        <p:txBody>
-          <a:bodyPr wrap="square" rtlCol="0">
-            <a:spAutoFit/>
-          </a:bodyPr>
-          <a:lstStyle/>
-          <a:p>
-            <a:r>
-              <a:rPr lang="en-US" sz="2400" dirty="0"/>
-              <a:t>Actually, just keep the filtering, and give me an approximate spike rate</a:t>
-            </a:r>
-          </a:p>
-          <a:p>
-            <a:endParaRPr lang="en-US" sz="2400" dirty="0"/>
-          </a:p>
-          <a:p>
-            <a:r>
-              <a:rPr lang="en-US" sz="2400" dirty="0"/>
-              <a:t>	=&gt; rate models</a:t>
-            </a:r>
-          </a:p>
-        </p:txBody>
-      </p:sp>
-      <p:sp>
-        <p:nvSpPr>
-          <p:cNvPr id="4" name="TextBox 3">
-            <a:extLst>
-              <a:ext uri="{FF2B5EF4-FFF2-40B4-BE49-F238E27FC236}">
-                <a16:creationId xmlns:a16="http://schemas.microsoft.com/office/drawing/2014/main" id="{1C0E9784-3D67-4880-7751-A7F1F552E340}"/>
-              </a:ext>
-            </a:extLst>
-          </p:cNvPr>
-          <p:cNvSpPr txBox="1"/>
-          <p:nvPr/>
-        </p:nvSpPr>
-        <p:spPr>
-          <a:xfrm>
-            <a:off x="0" y="2362654"/>
-            <a:ext cx="5671065" cy="584775"/>
-          </a:xfrm>
-          <a:custGeom>
-            <a:avLst/>
-            <a:gdLst>
-              <a:gd name="connsiteX0" fmla="*/ 0 w 5671065"/>
-              <a:gd name="connsiteY0" fmla="*/ 0 h 584775"/>
-              <a:gd name="connsiteX1" fmla="*/ 573408 w 5671065"/>
-              <a:gd name="connsiteY1" fmla="*/ 0 h 584775"/>
-              <a:gd name="connsiteX2" fmla="*/ 1090105 w 5671065"/>
-              <a:gd name="connsiteY2" fmla="*/ 0 h 584775"/>
-              <a:gd name="connsiteX3" fmla="*/ 1550091 w 5671065"/>
-              <a:gd name="connsiteY3" fmla="*/ 0 h 584775"/>
-              <a:gd name="connsiteX4" fmla="*/ 2180209 w 5671065"/>
-              <a:gd name="connsiteY4" fmla="*/ 0 h 584775"/>
-              <a:gd name="connsiteX5" fmla="*/ 2923749 w 5671065"/>
-              <a:gd name="connsiteY5" fmla="*/ 0 h 584775"/>
-              <a:gd name="connsiteX6" fmla="*/ 3553867 w 5671065"/>
-              <a:gd name="connsiteY6" fmla="*/ 0 h 584775"/>
-              <a:gd name="connsiteX7" fmla="*/ 4127275 w 5671065"/>
-              <a:gd name="connsiteY7" fmla="*/ 0 h 584775"/>
-              <a:gd name="connsiteX8" fmla="*/ 4870815 w 5671065"/>
-              <a:gd name="connsiteY8" fmla="*/ 0 h 584775"/>
-              <a:gd name="connsiteX9" fmla="*/ 5671065 w 5671065"/>
-              <a:gd name="connsiteY9" fmla="*/ 0 h 584775"/>
-              <a:gd name="connsiteX10" fmla="*/ 5671065 w 5671065"/>
-              <a:gd name="connsiteY10" fmla="*/ 584775 h 584775"/>
-              <a:gd name="connsiteX11" fmla="*/ 5211079 w 5671065"/>
-              <a:gd name="connsiteY11" fmla="*/ 584775 h 584775"/>
-              <a:gd name="connsiteX12" fmla="*/ 4637671 w 5671065"/>
-              <a:gd name="connsiteY12" fmla="*/ 584775 h 584775"/>
-              <a:gd name="connsiteX13" fmla="*/ 3894131 w 5671065"/>
-              <a:gd name="connsiteY13" fmla="*/ 584775 h 584775"/>
-              <a:gd name="connsiteX14" fmla="*/ 3264013 w 5671065"/>
-              <a:gd name="connsiteY14" fmla="*/ 584775 h 584775"/>
-              <a:gd name="connsiteX15" fmla="*/ 2747316 w 5671065"/>
-              <a:gd name="connsiteY15" fmla="*/ 584775 h 584775"/>
-              <a:gd name="connsiteX16" fmla="*/ 2060487 w 5671065"/>
-              <a:gd name="connsiteY16" fmla="*/ 584775 h 584775"/>
-              <a:gd name="connsiteX17" fmla="*/ 1543790 w 5671065"/>
-              <a:gd name="connsiteY17" fmla="*/ 584775 h 584775"/>
-              <a:gd name="connsiteX18" fmla="*/ 856961 w 5671065"/>
-              <a:gd name="connsiteY18" fmla="*/ 584775 h 584775"/>
-              <a:gd name="connsiteX19" fmla="*/ 0 w 5671065"/>
-              <a:gd name="connsiteY19" fmla="*/ 584775 h 584775"/>
-              <a:gd name="connsiteX20" fmla="*/ 0 w 5671065"/>
-              <a:gd name="connsiteY20" fmla="*/ 0 h 584775"/>
-            </a:gdLst>
-            <a:ahLst/>
-            <a:cxnLst>
-              <a:cxn ang="0">
-                <a:pos x="connsiteX0" y="connsiteY0"/>
-              </a:cxn>
-              <a:cxn ang="0">
-                <a:pos x="connsiteX1" y="connsiteY1"/>
-              </a:cxn>
-              <a:cxn ang="0">
-                <a:pos x="connsiteX2" y="connsiteY2"/>
-              </a:cxn>
-              <a:cxn ang="0">
-                <a:pos x="connsiteX3" y="connsiteY3"/>
-              </a:cxn>
-              <a:cxn ang="0">
-                <a:pos x="connsiteX4" y="connsiteY4"/>
-              </a:cxn>
-              <a:cxn ang="0">
-                <a:pos x="connsiteX5" y="connsiteY5"/>
-              </a:cxn>
-              <a:cxn ang="0">
-                <a:pos x="connsiteX6" y="connsiteY6"/>
-              </a:cxn>
-              <a:cxn ang="0">
-                <a:pos x="connsiteX7" y="connsiteY7"/>
-              </a:cxn>
-              <a:cxn ang="0">
-                <a:pos x="connsiteX8" y="connsiteY8"/>
-              </a:cxn>
-              <a:cxn ang="0">
-                <a:pos x="connsiteX9" y="connsiteY9"/>
-              </a:cxn>
-              <a:cxn ang="0">
-                <a:pos x="connsiteX10" y="connsiteY10"/>
-              </a:cxn>
-              <a:cxn ang="0">
-                <a:pos x="connsiteX11" y="connsiteY11"/>
-              </a:cxn>
-              <a:cxn ang="0">
-                <a:pos x="connsiteX12" y="connsiteY12"/>
-              </a:cxn>
-              <a:cxn ang="0">
-                <a:pos x="connsiteX13" y="connsiteY13"/>
-              </a:cxn>
-              <a:cxn ang="0">
-                <a:pos x="connsiteX14" y="connsiteY14"/>
-              </a:cxn>
-              <a:cxn ang="0">
-                <a:pos x="connsiteX15" y="connsiteY15"/>
-              </a:cxn>
-              <a:cxn ang="0">
-                <a:pos x="connsiteX16" y="connsiteY16"/>
-              </a:cxn>
-              <a:cxn ang="0">
-                <a:pos x="connsiteX17" y="connsiteY17"/>
-              </a:cxn>
-              <a:cxn ang="0">
-                <a:pos x="connsiteX18" y="connsiteY18"/>
-              </a:cxn>
-              <a:cxn ang="0">
-                <a:pos x="connsiteX19" y="connsiteY19"/>
-              </a:cxn>
-              <a:cxn ang="0">
-                <a:pos x="connsiteX20" y="connsiteY20"/>
-              </a:cxn>
-            </a:cxnLst>
-            <a:rect l="l" t="t" r="r" b="b"/>
-            <a:pathLst>
-              <a:path w="5671065" h="584775" extrusionOk="0">
-                <a:moveTo>
-                  <a:pt x="0" y="0"/>
-                </a:moveTo>
-                <a:cubicBezTo>
-                  <a:pt x="172188" y="18840"/>
-                  <a:pt x="446932" y="-17548"/>
-                  <a:pt x="573408" y="0"/>
-                </a:cubicBezTo>
-                <a:cubicBezTo>
-                  <a:pt x="699884" y="17548"/>
-                  <a:pt x="927333" y="14355"/>
-                  <a:pt x="1090105" y="0"/>
-                </a:cubicBezTo>
-                <a:cubicBezTo>
-                  <a:pt x="1252877" y="-14355"/>
-                  <a:pt x="1429293" y="13700"/>
-                  <a:pt x="1550091" y="0"/>
-                </a:cubicBezTo>
-                <a:cubicBezTo>
-                  <a:pt x="1670889" y="-13700"/>
-                  <a:pt x="1961431" y="23378"/>
-                  <a:pt x="2180209" y="0"/>
-                </a:cubicBezTo>
-                <a:cubicBezTo>
-                  <a:pt x="2398987" y="-23378"/>
-                  <a:pt x="2759703" y="-9896"/>
-                  <a:pt x="2923749" y="0"/>
-                </a:cubicBezTo>
-                <a:cubicBezTo>
-                  <a:pt x="3087795" y="9896"/>
-                  <a:pt x="3302537" y="-8488"/>
-                  <a:pt x="3553867" y="0"/>
-                </a:cubicBezTo>
-                <a:cubicBezTo>
-                  <a:pt x="3805197" y="8488"/>
-                  <a:pt x="3901079" y="-27579"/>
-                  <a:pt x="4127275" y="0"/>
-                </a:cubicBezTo>
-                <a:cubicBezTo>
-                  <a:pt x="4353471" y="27579"/>
-                  <a:pt x="4499386" y="-34171"/>
-                  <a:pt x="4870815" y="0"/>
-                </a:cubicBezTo>
-                <a:cubicBezTo>
-                  <a:pt x="5242244" y="34171"/>
-                  <a:pt x="5362002" y="-28493"/>
-                  <a:pt x="5671065" y="0"/>
-                </a:cubicBezTo>
-                <a:cubicBezTo>
-                  <a:pt x="5673970" y="242329"/>
-                  <a:pt x="5666756" y="396724"/>
-                  <a:pt x="5671065" y="584775"/>
-                </a:cubicBezTo>
-                <a:cubicBezTo>
-                  <a:pt x="5569933" y="569095"/>
-                  <a:pt x="5354033" y="604519"/>
-                  <a:pt x="5211079" y="584775"/>
-                </a:cubicBezTo>
-                <a:cubicBezTo>
-                  <a:pt x="5068125" y="565031"/>
-                  <a:pt x="4863397" y="558310"/>
-                  <a:pt x="4637671" y="584775"/>
-                </a:cubicBezTo>
-                <a:cubicBezTo>
-                  <a:pt x="4411945" y="611240"/>
-                  <a:pt x="4049973" y="576015"/>
-                  <a:pt x="3894131" y="584775"/>
-                </a:cubicBezTo>
-                <a:cubicBezTo>
-                  <a:pt x="3738289" y="593535"/>
-                  <a:pt x="3480653" y="578061"/>
-                  <a:pt x="3264013" y="584775"/>
-                </a:cubicBezTo>
-                <a:cubicBezTo>
-                  <a:pt x="3047373" y="591489"/>
-                  <a:pt x="2878818" y="559767"/>
-                  <a:pt x="2747316" y="584775"/>
-                </a:cubicBezTo>
-                <a:cubicBezTo>
-                  <a:pt x="2615814" y="609783"/>
-                  <a:pt x="2348530" y="569098"/>
-                  <a:pt x="2060487" y="584775"/>
-                </a:cubicBezTo>
-                <a:cubicBezTo>
-                  <a:pt x="1772444" y="600452"/>
-                  <a:pt x="1671847" y="595230"/>
-                  <a:pt x="1543790" y="584775"/>
-                </a:cubicBezTo>
-                <a:cubicBezTo>
-                  <a:pt x="1415733" y="574320"/>
-                  <a:pt x="1168933" y="557195"/>
-                  <a:pt x="856961" y="584775"/>
-                </a:cubicBezTo>
-                <a:cubicBezTo>
-                  <a:pt x="544989" y="612355"/>
-                  <a:pt x="247224" y="622591"/>
-                  <a:pt x="0" y="584775"/>
-                </a:cubicBezTo>
-                <a:cubicBezTo>
-                  <a:pt x="20094" y="465216"/>
-                  <a:pt x="11161" y="265012"/>
-                  <a:pt x="0" y="0"/>
-                </a:cubicBezTo>
-                <a:close/>
-              </a:path>
-            </a:pathLst>
-          </a:custGeom>
-          <a:noFill/>
-          <a:ln>
-            <a:noFill/>
-            <a:extLst>
-              <a:ext uri="{C807C97D-BFC1-408E-A445-0C87EB9F89A2}">
-                <ask:lineSketchStyleProps xmlns:ask="http://schemas.microsoft.com/office/drawing/2018/sketchyshapes" sd="2835737594">
-                  <a:prstGeom prst="rect">
-                    <a:avLst/>
-                  </a:prstGeom>
-                  <ask:type>
-                    <ask:lineSketchFreehand/>
-                  </ask:type>
-                </ask:lineSketchStyleProps>
-              </a:ext>
-            </a:extLst>
-          </a:ln>
-        </p:spPr>
-        <p:txBody>
-          <a:bodyPr wrap="square" rtlCol="0">
-            <a:spAutoFit/>
-          </a:bodyPr>
-          <a:lstStyle/>
-          <a:p>
-            <a:pPr algn="ctr"/>
-            <a:r>
-              <a:rPr lang="el-GR" sz="3200" b="1" dirty="0">
-                <a:solidFill>
-                  <a:srgbClr val="FDB879"/>
-                </a:solidFill>
-              </a:rPr>
-              <a:t>τ</a:t>
-            </a:r>
-            <a:r>
-              <a:rPr lang="en-US" sz="3200" b="1" dirty="0"/>
-              <a:t> </a:t>
-            </a:r>
-            <a:r>
-              <a:rPr lang="en-US" sz="3200" b="1" dirty="0" err="1"/>
-              <a:t>dV</a:t>
-            </a:r>
-            <a:r>
-              <a:rPr lang="en-US" sz="3200" b="1" dirty="0"/>
-              <a:t>/dt  =  </a:t>
-            </a:r>
-            <a:r>
-              <a:rPr lang="en-US" sz="3200" b="1" dirty="0">
-                <a:solidFill>
-                  <a:srgbClr val="84C777"/>
-                </a:solidFill>
-              </a:rPr>
-              <a:t>– V </a:t>
-            </a:r>
-            <a:r>
-              <a:rPr lang="en-US" sz="3200" b="1" dirty="0"/>
-              <a:t>+ </a:t>
-            </a:r>
-            <a:r>
-              <a:rPr lang="en-US" sz="3200" b="1" dirty="0" err="1"/>
-              <a:t>I</a:t>
-            </a:r>
-            <a:r>
-              <a:rPr lang="en-US" sz="3200" b="1" baseline="-25000" dirty="0" err="1"/>
-              <a:t>external</a:t>
-            </a:r>
-            <a:endParaRPr lang="en-US" sz="3200" b="1" baseline="-25000" dirty="0"/>
-          </a:p>
-        </p:txBody>
-      </p:sp>
-      <p:sp>
-        <p:nvSpPr>
-          <p:cNvPr id="3" name="TextBox 2">
-            <a:extLst>
-              <a:ext uri="{FF2B5EF4-FFF2-40B4-BE49-F238E27FC236}">
-                <a16:creationId xmlns:a16="http://schemas.microsoft.com/office/drawing/2014/main" id="{0E4B8B5A-D537-E7AD-1EBD-8CFAA89AAA16}"/>
-              </a:ext>
-            </a:extLst>
-          </p:cNvPr>
-          <p:cNvSpPr txBox="1"/>
-          <p:nvPr/>
-        </p:nvSpPr>
-        <p:spPr>
-          <a:xfrm>
-            <a:off x="1281669" y="3106964"/>
-            <a:ext cx="3008870" cy="584775"/>
-          </a:xfrm>
-          <a:prstGeom prst="rect">
-            <a:avLst/>
-          </a:prstGeom>
-          <a:noFill/>
-        </p:spPr>
-        <p:txBody>
-          <a:bodyPr wrap="square" rtlCol="0">
-            <a:spAutoFit/>
-          </a:bodyPr>
-          <a:lstStyle/>
-          <a:p>
-            <a:pPr algn="ctr"/>
-            <a:r>
-              <a:rPr lang="en-US" sz="3200" b="1" dirty="0"/>
-              <a:t>r(t)  =  </a:t>
-            </a:r>
-            <a:r>
-              <a:rPr lang="el-GR" sz="3200" b="1" dirty="0"/>
-              <a:t>φ</a:t>
-            </a:r>
-            <a:r>
-              <a:rPr lang="en-US" sz="3200" b="1" dirty="0"/>
-              <a:t>(V(t))</a:t>
-            </a:r>
-            <a:endParaRPr lang="en-US" sz="3200" b="1" baseline="-25000" dirty="0"/>
-          </a:p>
-        </p:txBody>
-      </p:sp>
-      <p:grpSp>
-        <p:nvGrpSpPr>
-          <p:cNvPr id="21" name="Group 20">
-            <a:extLst>
-              <a:ext uri="{FF2B5EF4-FFF2-40B4-BE49-F238E27FC236}">
-                <a16:creationId xmlns:a16="http://schemas.microsoft.com/office/drawing/2014/main" id="{70BA3FAE-ADA4-EB12-2ADF-7B6A637AAE8E}"/>
-              </a:ext>
-            </a:extLst>
-          </p:cNvPr>
-          <p:cNvGrpSpPr/>
-          <p:nvPr/>
-        </p:nvGrpSpPr>
-        <p:grpSpPr>
-          <a:xfrm>
-            <a:off x="0" y="4064570"/>
-            <a:ext cx="4349025" cy="1783673"/>
-            <a:chOff x="0" y="3777246"/>
-            <a:chExt cx="4349025" cy="1783673"/>
-          </a:xfrm>
-        </p:grpSpPr>
-        <p:sp>
-          <p:nvSpPr>
-            <p:cNvPr id="16" name="TextBox 15">
-              <a:extLst>
-                <a:ext uri="{FF2B5EF4-FFF2-40B4-BE49-F238E27FC236}">
-                  <a16:creationId xmlns:a16="http://schemas.microsoft.com/office/drawing/2014/main" id="{4A0DBA8F-1E9F-8EE5-0A82-7D0DD5DA6558}"/>
-                </a:ext>
-              </a:extLst>
-            </p:cNvPr>
-            <p:cNvSpPr txBox="1"/>
-            <p:nvPr/>
-          </p:nvSpPr>
-          <p:spPr>
-            <a:xfrm>
-              <a:off x="0" y="4187748"/>
-              <a:ext cx="3008870" cy="584775"/>
-            </a:xfrm>
-            <a:prstGeom prst="rect">
-              <a:avLst/>
-            </a:prstGeom>
-            <a:noFill/>
-          </p:spPr>
-          <p:txBody>
-            <a:bodyPr wrap="square" rtlCol="0">
-              <a:spAutoFit/>
-            </a:bodyPr>
-            <a:lstStyle/>
-            <a:p>
-              <a:pPr algn="ctr"/>
-              <a:r>
-                <a:rPr lang="en-US" sz="3200" dirty="0"/>
-                <a:t>where </a:t>
-              </a:r>
-              <a:r>
-                <a:rPr lang="el-GR" sz="3200" b="1" dirty="0"/>
-                <a:t>φ</a:t>
-              </a:r>
-              <a:r>
-                <a:rPr lang="en-US" sz="3200" b="1" dirty="0"/>
-                <a:t>(x) = </a:t>
-              </a:r>
-              <a:endParaRPr lang="en-US" sz="3200" baseline="-25000" dirty="0"/>
-            </a:p>
-          </p:txBody>
-        </p:sp>
-        <p:grpSp>
-          <p:nvGrpSpPr>
-            <p:cNvPr id="19" name="Group 18">
-              <a:extLst>
-                <a:ext uri="{FF2B5EF4-FFF2-40B4-BE49-F238E27FC236}">
-                  <a16:creationId xmlns:a16="http://schemas.microsoft.com/office/drawing/2014/main" id="{67C4DF32-0F99-6470-BA01-39A68A754B46}"/>
-                </a:ext>
-              </a:extLst>
-            </p:cNvPr>
-            <p:cNvGrpSpPr/>
-            <p:nvPr/>
-          </p:nvGrpSpPr>
-          <p:grpSpPr>
-            <a:xfrm>
-              <a:off x="2539606" y="3777246"/>
-              <a:ext cx="1809419" cy="1070255"/>
-              <a:chOff x="2539606" y="3777246"/>
-              <a:chExt cx="1809419" cy="1070255"/>
-            </a:xfrm>
-          </p:grpSpPr>
-          <p:sp>
-            <p:nvSpPr>
-              <p:cNvPr id="6" name="TextBox 5">
-                <a:extLst>
-                  <a:ext uri="{FF2B5EF4-FFF2-40B4-BE49-F238E27FC236}">
-                    <a16:creationId xmlns:a16="http://schemas.microsoft.com/office/drawing/2014/main" id="{8DAE340E-1A14-A46D-CC4A-09E037D51FB1}"/>
-                  </a:ext>
-                </a:extLst>
-              </p:cNvPr>
-              <p:cNvSpPr txBox="1"/>
-              <p:nvPr/>
-            </p:nvSpPr>
-            <p:spPr>
-              <a:xfrm>
-                <a:off x="2979192" y="3777246"/>
-                <a:ext cx="914400" cy="584775"/>
-              </a:xfrm>
-              <a:prstGeom prst="rect">
-                <a:avLst/>
-              </a:prstGeom>
-              <a:noFill/>
-            </p:spPr>
-            <p:txBody>
-              <a:bodyPr wrap="square" rtlCol="0">
-                <a:spAutoFit/>
-              </a:bodyPr>
-              <a:lstStyle/>
-              <a:p>
-                <a:pPr algn="ctr"/>
-                <a:r>
-                  <a:rPr lang="en-US" sz="3200" b="1" dirty="0"/>
-                  <a:t>1</a:t>
-                </a:r>
-              </a:p>
-            </p:txBody>
-          </p:sp>
-          <p:cxnSp>
-            <p:nvCxnSpPr>
-              <p:cNvPr id="7" name="Straight Arrow Connector 6">
-                <a:extLst>
-                  <a:ext uri="{FF2B5EF4-FFF2-40B4-BE49-F238E27FC236}">
-                    <a16:creationId xmlns:a16="http://schemas.microsoft.com/office/drawing/2014/main" id="{AF703557-18A5-6152-C415-6E14D6F027B8}"/>
-                  </a:ext>
-                </a:extLst>
-              </p:cNvPr>
-              <p:cNvCxnSpPr>
-                <a:cxnSpLocks/>
-              </p:cNvCxnSpPr>
-              <p:nvPr/>
-            </p:nvCxnSpPr>
-            <p:spPr>
-              <a:xfrm>
-                <a:off x="2883169" y="4275902"/>
-                <a:ext cx="1131160" cy="0"/>
-              </a:xfrm>
-              <a:prstGeom prst="straightConnector1">
-                <a:avLst/>
-              </a:prstGeom>
-              <a:ln w="19050"/>
-            </p:spPr>
-            <p:style>
-              <a:lnRef idx="1">
-                <a:schemeClr val="dk1"/>
-              </a:lnRef>
-              <a:fillRef idx="0">
-                <a:schemeClr val="dk1"/>
-              </a:fillRef>
-              <a:effectRef idx="0">
-                <a:schemeClr val="dk1"/>
-              </a:effectRef>
-              <a:fontRef idx="minor">
-                <a:schemeClr val="tx1"/>
-              </a:fontRef>
-            </p:style>
-          </p:cxnSp>
-          <p:sp>
-            <p:nvSpPr>
-              <p:cNvPr id="18" name="TextBox 17">
-                <a:extLst>
-                  <a:ext uri="{FF2B5EF4-FFF2-40B4-BE49-F238E27FC236}">
-                    <a16:creationId xmlns:a16="http://schemas.microsoft.com/office/drawing/2014/main" id="{DBFAB36F-0A68-164E-EA31-8F8CDBAB4C2F}"/>
-                  </a:ext>
-                </a:extLst>
-              </p:cNvPr>
-              <p:cNvSpPr txBox="1"/>
-              <p:nvPr/>
-            </p:nvSpPr>
-            <p:spPr>
-              <a:xfrm>
-                <a:off x="2539606" y="4262726"/>
-                <a:ext cx="1809419" cy="584775"/>
-              </a:xfrm>
-              <a:prstGeom prst="rect">
-                <a:avLst/>
-              </a:prstGeom>
-              <a:noFill/>
-            </p:spPr>
-            <p:txBody>
-              <a:bodyPr wrap="square" rtlCol="0">
-                <a:spAutoFit/>
-              </a:bodyPr>
-              <a:lstStyle/>
-              <a:p>
-                <a:pPr algn="ctr"/>
-                <a:r>
-                  <a:rPr lang="en-US" sz="3200" b="1" dirty="0"/>
-                  <a:t>1 + e</a:t>
-                </a:r>
-                <a:r>
-                  <a:rPr lang="en-US" sz="3200" b="1" baseline="30000" dirty="0"/>
-                  <a:t>-x</a:t>
-                </a:r>
-                <a:endParaRPr lang="en-US" sz="3200" b="1" dirty="0"/>
-              </a:p>
-            </p:txBody>
-          </p:sp>
-        </p:grpSp>
-        <p:sp>
-          <p:nvSpPr>
-            <p:cNvPr id="20" name="TextBox 19">
-              <a:extLst>
-                <a:ext uri="{FF2B5EF4-FFF2-40B4-BE49-F238E27FC236}">
-                  <a16:creationId xmlns:a16="http://schemas.microsoft.com/office/drawing/2014/main" id="{C5FC41BB-889E-6D6B-A5C9-3D3C2C83D2A3}"/>
-                </a:ext>
-              </a:extLst>
-            </p:cNvPr>
-            <p:cNvSpPr txBox="1"/>
-            <p:nvPr/>
-          </p:nvSpPr>
-          <p:spPr>
-            <a:xfrm>
-              <a:off x="2553410" y="4976144"/>
-              <a:ext cx="1795615" cy="584775"/>
-            </a:xfrm>
-            <a:prstGeom prst="rect">
-              <a:avLst/>
-            </a:prstGeom>
-            <a:noFill/>
-          </p:spPr>
-          <p:txBody>
-            <a:bodyPr wrap="square" rtlCol="0">
-              <a:spAutoFit/>
-            </a:bodyPr>
-            <a:lstStyle/>
-            <a:p>
-              <a:pPr algn="ctr"/>
-              <a:r>
-                <a:rPr lang="en-US" sz="3200" b="1" dirty="0"/>
-                <a:t>tanh(x)</a:t>
-              </a:r>
-            </a:p>
-          </p:txBody>
-        </p:sp>
-      </p:grpSp>
-      <p:grpSp>
-        <p:nvGrpSpPr>
-          <p:cNvPr id="23" name="Group 22">
-            <a:extLst>
-              <a:ext uri="{FF2B5EF4-FFF2-40B4-BE49-F238E27FC236}">
-                <a16:creationId xmlns:a16="http://schemas.microsoft.com/office/drawing/2014/main" id="{20A4C050-7D3F-D7BE-AB0E-FEE8B191FD2A}"/>
-              </a:ext>
-            </a:extLst>
-          </p:cNvPr>
-          <p:cNvGrpSpPr/>
-          <p:nvPr/>
-        </p:nvGrpSpPr>
-        <p:grpSpPr>
-          <a:xfrm>
-            <a:off x="6038215" y="1050943"/>
-            <a:ext cx="6037832" cy="5474549"/>
-            <a:chOff x="6038215" y="450638"/>
-            <a:chExt cx="6037832" cy="5474549"/>
-          </a:xfrm>
-        </p:grpSpPr>
-        <p:pic>
-          <p:nvPicPr>
-            <p:cNvPr id="2050" name="Picture 2" descr="Figure 1. Examples of network activity as a function of s and g. Each inset shows x(t) for 6 out of 400 network units as a function of time, with its location indicating the values g and s used: for insets 1-12 (in order): (g, s) = (0.5,2.5), (1.3,2.5), (2.5,2.5), (0.6,1.5), (1.5,1.5), (2.5,1.5), (0.4,0.4), (1.5,0.5), (2.5,0.5), (0.4,-0.4), (1.2, -0.3), (2.5,-0.5). The long-dashed line is the boundary between activity that decays to 0 (inserts 7, 10 &amp; 11) and persistent chaotic activity (inserts 8, 9 &amp; 12). The solid curve is the boundary between persistent chaos and what we will show to be transient chaotic activity that ultimately converges to one of many nonzero fixed points (inserts 1-6). For inserts 3-6, there is a break in the time axis, reflecting the long time required for convergence to a fixed point. The short-dashed line simply indicates s=1.">
-              <a:extLst>
-                <a:ext uri="{FF2B5EF4-FFF2-40B4-BE49-F238E27FC236}">
-                  <a16:creationId xmlns:a16="http://schemas.microsoft.com/office/drawing/2014/main" id="{16D8960A-C2ED-35A6-753E-98CBECE9EEA1}"/>
-                </a:ext>
-              </a:extLst>
-            </p:cNvPr>
-            <p:cNvPicPr>
-              <a:picLocks noChangeAspect="1" noChangeArrowheads="1"/>
-            </p:cNvPicPr>
-            <p:nvPr/>
-          </p:nvPicPr>
-          <p:blipFill rotWithShape="1">
-            <a:blip r:embed="rId2">
-              <a:extLst>
-                <a:ext uri="{28A0092B-C50C-407E-A947-70E740481C1C}">
-                  <a14:useLocalDpi xmlns:a14="http://schemas.microsoft.com/office/drawing/2010/main" val="0"/>
-                </a:ext>
-              </a:extLst>
-            </a:blip>
-            <a:srcRect b="2724"/>
-            <a:stretch/>
-          </p:blipFill>
-          <p:spPr bwMode="auto">
-            <a:xfrm>
-              <a:off x="6038215" y="966811"/>
-              <a:ext cx="6037832" cy="4519589"/>
-            </a:xfrm>
-            <a:prstGeom prst="rect">
-              <a:avLst/>
-            </a:prstGeom>
-            <a:noFill/>
-            <a:extLst>
-              <a:ext uri="{909E8E84-426E-40DD-AFC4-6F175D3DCCD1}">
-                <a14:hiddenFill xmlns:a14="http://schemas.microsoft.com/office/drawing/2010/main">
-                  <a:solidFill>
-                    <a:srgbClr val="FFFFFF"/>
-                  </a:solidFill>
-                </a14:hiddenFill>
-              </a:ext>
-            </a:extLst>
-          </p:spPr>
-        </p:pic>
-        <p:sp>
-          <p:nvSpPr>
-            <p:cNvPr id="22" name="TextBox 21">
-              <a:extLst>
-                <a:ext uri="{FF2B5EF4-FFF2-40B4-BE49-F238E27FC236}">
-                  <a16:creationId xmlns:a16="http://schemas.microsoft.com/office/drawing/2014/main" id="{BA4EB256-3DD7-32E8-0613-919D13FD5A96}"/>
-                </a:ext>
-              </a:extLst>
-            </p:cNvPr>
-            <p:cNvSpPr txBox="1"/>
-            <p:nvPr/>
-          </p:nvSpPr>
-          <p:spPr>
-            <a:xfrm>
-              <a:off x="6512160" y="5555855"/>
-              <a:ext cx="5467864" cy="369332"/>
-            </a:xfrm>
-            <a:prstGeom prst="rect">
-              <a:avLst/>
-            </a:prstGeom>
-            <a:noFill/>
-          </p:spPr>
-          <p:txBody>
-            <a:bodyPr wrap="square" rtlCol="0">
-              <a:spAutoFit/>
-            </a:bodyPr>
-            <a:lstStyle/>
-            <a:p>
-              <a:pPr algn="r"/>
-              <a:r>
-                <a:rPr lang="en-US" dirty="0"/>
-                <a:t>Stern, </a:t>
-              </a:r>
-              <a:r>
-                <a:rPr lang="en-US" dirty="0" err="1"/>
-                <a:t>Sompolinsky</a:t>
-              </a:r>
-              <a:r>
-                <a:rPr lang="en-US" dirty="0"/>
-                <a:t>, and Abbott (2014) PRE</a:t>
-              </a:r>
-            </a:p>
-          </p:txBody>
-        </p:sp>
-        <p:pic>
-          <p:nvPicPr>
-            <p:cNvPr id="2052" name="Picture 4" descr="It's like sigma summation notation, except instead of summing the argument over all values of i, you 2 the argument over all values of 2.">
-              <a:extLst>
-                <a:ext uri="{FF2B5EF4-FFF2-40B4-BE49-F238E27FC236}">
-                  <a16:creationId xmlns:a16="http://schemas.microsoft.com/office/drawing/2014/main" id="{6B18AB50-A0CB-D68E-0292-377B1667D170}"/>
-                </a:ext>
-              </a:extLst>
-            </p:cNvPr>
-            <p:cNvPicPr>
-              <a:picLocks noChangeAspect="1" noChangeArrowheads="1"/>
-            </p:cNvPicPr>
-            <p:nvPr/>
-          </p:nvPicPr>
-          <p:blipFill rotWithShape="1">
-            <a:blip r:embed="rId3">
-              <a:extLst>
-                <a:ext uri="{28A0092B-C50C-407E-A947-70E740481C1C}">
-                  <a14:useLocalDpi xmlns:a14="http://schemas.microsoft.com/office/drawing/2010/main" val="0"/>
-                </a:ext>
-              </a:extLst>
-            </a:blip>
-            <a:srcRect l="33565" t="82544" r="35620" b="3610"/>
-            <a:stretch/>
-          </p:blipFill>
-          <p:spPr bwMode="auto">
-            <a:xfrm>
-              <a:off x="8628254" y="450638"/>
-              <a:ext cx="1235676" cy="425988"/>
-            </a:xfrm>
-            <a:prstGeom prst="rect">
-              <a:avLst/>
-            </a:prstGeom>
-            <a:noFill/>
-            <a:extLst>
-              <a:ext uri="{909E8E84-426E-40DD-AFC4-6F175D3DCCD1}">
-                <a14:hiddenFill xmlns:a14="http://schemas.microsoft.com/office/drawing/2010/main">
-                  <a:solidFill>
-                    <a:srgbClr val="FFFFFF"/>
-                  </a:solidFill>
-                </a14:hiddenFill>
-              </a:ext>
-            </a:extLst>
-          </p:spPr>
-        </p:pic>
-      </p:grpSp>
-    </p:spTree>
-    <p:extLst>
-      <p:ext uri="{BB962C8B-B14F-4D97-AF65-F5344CB8AC3E}">
-        <p14:creationId xmlns:p14="http://schemas.microsoft.com/office/powerpoint/2010/main" val="3108576389"/>
-      </p:ext>
-    </p:extLst>
-  </p:cSld>
-  <p:clrMapOvr>
-    <a:masterClrMapping/>
-  </p:clrMapOvr>
-  <p:timing>
-    <p:tnLst>
-      <p:par>
-        <p:cTn id="1" dur="indefinite" restart="never" nodeType="tmRoot">
-          <p:childTnLst>
-            <p:seq concurrent="1" nextAc="seek">
-              <p:cTn id="2" dur="indefinite" nodeType="mainSeq">
-                <p:childTnLst>
-                  <p:par>
-                    <p:cTn id="3" fill="hold">
-                      <p:stCondLst>
-                        <p:cond delay="indefinite"/>
-                      </p:stCondLst>
-                      <p:childTnLst>
-                        <p:par>
-                          <p:cTn id="4" fill="hold">
-                            <p:stCondLst>
-                              <p:cond delay="0"/>
-                            </p:stCondLst>
-                            <p:childTnLst>
-                              <p:par>
-                                <p:cTn id="5" presetID="10" presetClass="entr" presetSubtype="0" fill="hold" grpId="0" nodeType="clickEffect">
-                                  <p:stCondLst>
-                                    <p:cond delay="0"/>
-                                  </p:stCondLst>
-                                  <p:childTnLst>
-                                    <p:set>
-                                      <p:cBhvr>
-                                        <p:cTn id="6" dur="1" fill="hold">
-                                          <p:stCondLst>
-                                            <p:cond delay="0"/>
-                                          </p:stCondLst>
-                                        </p:cTn>
-                                        <p:tgtEl>
-                                          <p:spTgt spid="3"/>
-                                        </p:tgtEl>
-                                        <p:attrNameLst>
-                                          <p:attrName>style.visibility</p:attrName>
-                                        </p:attrNameLst>
-                                      </p:cBhvr>
-                                      <p:to>
-                                        <p:strVal val="visible"/>
-                                      </p:to>
-                                    </p:set>
-                                    <p:animEffect transition="in" filter="fade">
-                                      <p:cBhvr>
-                                        <p:cTn id="7" dur="100"/>
-                                        <p:tgtEl>
-                                          <p:spTgt spid="3"/>
-                                        </p:tgtEl>
-                                      </p:cBhvr>
-                                    </p:animEffect>
-                                  </p:childTnLst>
-                                </p:cTn>
-                              </p:par>
-                            </p:childTnLst>
-                          </p:cTn>
-                        </p:par>
-                      </p:childTnLst>
-                    </p:cTn>
-                  </p:par>
-                  <p:par>
-                    <p:cTn id="8" fill="hold">
-                      <p:stCondLst>
-                        <p:cond delay="indefinite"/>
-                      </p:stCondLst>
-                      <p:childTnLst>
-                        <p:par>
-                          <p:cTn id="9" fill="hold">
-                            <p:stCondLst>
-                              <p:cond delay="0"/>
-                            </p:stCondLst>
-                            <p:childTnLst>
-                              <p:par>
-                                <p:cTn id="10" presetID="10" presetClass="entr" presetSubtype="0" fill="hold" nodeType="clickEffect">
-                                  <p:stCondLst>
-                                    <p:cond delay="0"/>
-                                  </p:stCondLst>
-                                  <p:childTnLst>
-                                    <p:set>
-                                      <p:cBhvr>
-                                        <p:cTn id="11" dur="1" fill="hold">
-                                          <p:stCondLst>
-                                            <p:cond delay="0"/>
-                                          </p:stCondLst>
-                                        </p:cTn>
-                                        <p:tgtEl>
-                                          <p:spTgt spid="21"/>
-                                        </p:tgtEl>
-                                        <p:attrNameLst>
-                                          <p:attrName>style.visibility</p:attrName>
-                                        </p:attrNameLst>
-                                      </p:cBhvr>
-                                      <p:to>
-                                        <p:strVal val="visible"/>
-                                      </p:to>
-                                    </p:set>
-                                    <p:animEffect transition="in" filter="fade">
-                                      <p:cBhvr>
-                                        <p:cTn id="12" dur="100"/>
-                                        <p:tgtEl>
-                                          <p:spTgt spid="21"/>
-                                        </p:tgtEl>
-                                      </p:cBhvr>
-                                    </p:animEffect>
-                                  </p:childTnLst>
-                                </p:cTn>
-                              </p:par>
-                            </p:childTnLst>
-                          </p:cTn>
-                        </p:par>
-                      </p:childTnLst>
-                    </p:cTn>
-                  </p:par>
-                  <p:par>
-                    <p:cTn id="13" fill="hold">
-                      <p:stCondLst>
-                        <p:cond delay="indefinite"/>
-                      </p:stCondLst>
-                      <p:childTnLst>
-                        <p:par>
-                          <p:cTn id="14" fill="hold">
-                            <p:stCondLst>
-                              <p:cond delay="0"/>
-                            </p:stCondLst>
-                            <p:childTnLst>
-                              <p:par>
-                                <p:cTn id="15" presetID="10" presetClass="entr" presetSubtype="0" fill="hold" nodeType="clickEffect">
-                                  <p:stCondLst>
-                                    <p:cond delay="0"/>
-                                  </p:stCondLst>
-                                  <p:childTnLst>
-                                    <p:set>
-                                      <p:cBhvr>
-                                        <p:cTn id="16" dur="1" fill="hold">
-                                          <p:stCondLst>
-                                            <p:cond delay="0"/>
-                                          </p:stCondLst>
-                                        </p:cTn>
-                                        <p:tgtEl>
-                                          <p:spTgt spid="23"/>
-                                        </p:tgtEl>
-                                        <p:attrNameLst>
-                                          <p:attrName>style.visibility</p:attrName>
-                                        </p:attrNameLst>
-                                      </p:cBhvr>
-                                      <p:to>
-                                        <p:strVal val="visible"/>
-                                      </p:to>
-                                    </p:set>
-                                    <p:animEffect transition="in" filter="fade">
-                                      <p:cBhvr>
-                                        <p:cTn id="17" dur="100"/>
-                                        <p:tgtEl>
-                                          <p:spTgt spid="23"/>
-                                        </p:tgtEl>
-                                      </p:cBhvr>
-                                    </p:animEffect>
-                                  </p:childTnLst>
-                                </p:cTn>
-                              </p:par>
-                            </p:childTnLst>
-                          </p:cTn>
-                        </p:par>
-                      </p:childTnLst>
-                    </p:cTn>
-                  </p:par>
-                </p:childTnLst>
-              </p:cTn>
-              <p:prevCondLst>
-                <p:cond evt="onPrev" delay="0">
-                  <p:tgtEl>
-                    <p:sldTgt/>
-                  </p:tgtEl>
-                </p:cond>
-              </p:prevCondLst>
-              <p:nextCondLst>
-                <p:cond evt="onNext" delay="0">
-                  <p:tgtEl>
-                    <p:sldTgt/>
-                  </p:tgtEl>
-                </p:cond>
-              </p:nextCondLst>
-            </p:seq>
-          </p:childTnLst>
-        </p:cTn>
-      </p:par>
-    </p:tnLst>
-    <p:bldLst>
-      <p:bldP spid="3" grpId="0"/>
     </p:bldLst>
   </p:timing>
 </p:sld>
@@ -18372,6 +17512,1018 @@
       </p:grpSpPr>
       <p:sp>
         <p:nvSpPr>
+          <p:cNvPr id="2" name="TextBox 1">
+            <a:extLst>
+              <a:ext uri="{FF2B5EF4-FFF2-40B4-BE49-F238E27FC236}">
+                <a16:creationId xmlns:a16="http://schemas.microsoft.com/office/drawing/2014/main" id="{1D404F9D-E56C-A2E2-F0D4-262A3602E94A}"/>
+              </a:ext>
+            </a:extLst>
+          </p:cNvPr>
+          <p:cNvSpPr txBox="1"/>
+          <p:nvPr/>
+        </p:nvSpPr>
+        <p:spPr>
+          <a:xfrm>
+            <a:off x="211973" y="332508"/>
+            <a:ext cx="11768051" cy="1200329"/>
+          </a:xfrm>
+          <a:prstGeom prst="rect">
+            <a:avLst/>
+          </a:prstGeom>
+          <a:noFill/>
+        </p:spPr>
+        <p:txBody>
+          <a:bodyPr wrap="square" rtlCol="0">
+            <a:spAutoFit/>
+          </a:bodyPr>
+          <a:lstStyle/>
+          <a:p>
+            <a:r>
+              <a:rPr lang="en-US" sz="2400" dirty="0"/>
+              <a:t>Actually, just keep the filtering, and give me an approximate spike rate</a:t>
+            </a:r>
+          </a:p>
+          <a:p>
+            <a:endParaRPr lang="en-US" sz="2400" dirty="0"/>
+          </a:p>
+          <a:p>
+            <a:r>
+              <a:rPr lang="en-US" sz="2400" dirty="0"/>
+              <a:t>	=&gt; rate models</a:t>
+            </a:r>
+          </a:p>
+        </p:txBody>
+      </p:sp>
+      <p:sp>
+        <p:nvSpPr>
+          <p:cNvPr id="4" name="TextBox 3">
+            <a:extLst>
+              <a:ext uri="{FF2B5EF4-FFF2-40B4-BE49-F238E27FC236}">
+                <a16:creationId xmlns:a16="http://schemas.microsoft.com/office/drawing/2014/main" id="{1C0E9784-3D67-4880-7751-A7F1F552E340}"/>
+              </a:ext>
+            </a:extLst>
+          </p:cNvPr>
+          <p:cNvSpPr txBox="1"/>
+          <p:nvPr/>
+        </p:nvSpPr>
+        <p:spPr>
+          <a:xfrm>
+            <a:off x="0" y="2362654"/>
+            <a:ext cx="5671065" cy="584775"/>
+          </a:xfrm>
+          <a:custGeom>
+            <a:avLst/>
+            <a:gdLst>
+              <a:gd name="connsiteX0" fmla="*/ 0 w 5671065"/>
+              <a:gd name="connsiteY0" fmla="*/ 0 h 584775"/>
+              <a:gd name="connsiteX1" fmla="*/ 573408 w 5671065"/>
+              <a:gd name="connsiteY1" fmla="*/ 0 h 584775"/>
+              <a:gd name="connsiteX2" fmla="*/ 1090105 w 5671065"/>
+              <a:gd name="connsiteY2" fmla="*/ 0 h 584775"/>
+              <a:gd name="connsiteX3" fmla="*/ 1550091 w 5671065"/>
+              <a:gd name="connsiteY3" fmla="*/ 0 h 584775"/>
+              <a:gd name="connsiteX4" fmla="*/ 2180209 w 5671065"/>
+              <a:gd name="connsiteY4" fmla="*/ 0 h 584775"/>
+              <a:gd name="connsiteX5" fmla="*/ 2923749 w 5671065"/>
+              <a:gd name="connsiteY5" fmla="*/ 0 h 584775"/>
+              <a:gd name="connsiteX6" fmla="*/ 3553867 w 5671065"/>
+              <a:gd name="connsiteY6" fmla="*/ 0 h 584775"/>
+              <a:gd name="connsiteX7" fmla="*/ 4127275 w 5671065"/>
+              <a:gd name="connsiteY7" fmla="*/ 0 h 584775"/>
+              <a:gd name="connsiteX8" fmla="*/ 4870815 w 5671065"/>
+              <a:gd name="connsiteY8" fmla="*/ 0 h 584775"/>
+              <a:gd name="connsiteX9" fmla="*/ 5671065 w 5671065"/>
+              <a:gd name="connsiteY9" fmla="*/ 0 h 584775"/>
+              <a:gd name="connsiteX10" fmla="*/ 5671065 w 5671065"/>
+              <a:gd name="connsiteY10" fmla="*/ 584775 h 584775"/>
+              <a:gd name="connsiteX11" fmla="*/ 5211079 w 5671065"/>
+              <a:gd name="connsiteY11" fmla="*/ 584775 h 584775"/>
+              <a:gd name="connsiteX12" fmla="*/ 4637671 w 5671065"/>
+              <a:gd name="connsiteY12" fmla="*/ 584775 h 584775"/>
+              <a:gd name="connsiteX13" fmla="*/ 3894131 w 5671065"/>
+              <a:gd name="connsiteY13" fmla="*/ 584775 h 584775"/>
+              <a:gd name="connsiteX14" fmla="*/ 3264013 w 5671065"/>
+              <a:gd name="connsiteY14" fmla="*/ 584775 h 584775"/>
+              <a:gd name="connsiteX15" fmla="*/ 2747316 w 5671065"/>
+              <a:gd name="connsiteY15" fmla="*/ 584775 h 584775"/>
+              <a:gd name="connsiteX16" fmla="*/ 2060487 w 5671065"/>
+              <a:gd name="connsiteY16" fmla="*/ 584775 h 584775"/>
+              <a:gd name="connsiteX17" fmla="*/ 1543790 w 5671065"/>
+              <a:gd name="connsiteY17" fmla="*/ 584775 h 584775"/>
+              <a:gd name="connsiteX18" fmla="*/ 856961 w 5671065"/>
+              <a:gd name="connsiteY18" fmla="*/ 584775 h 584775"/>
+              <a:gd name="connsiteX19" fmla="*/ 0 w 5671065"/>
+              <a:gd name="connsiteY19" fmla="*/ 584775 h 584775"/>
+              <a:gd name="connsiteX20" fmla="*/ 0 w 5671065"/>
+              <a:gd name="connsiteY20" fmla="*/ 0 h 584775"/>
+            </a:gdLst>
+            <a:ahLst/>
+            <a:cxnLst>
+              <a:cxn ang="0">
+                <a:pos x="connsiteX0" y="connsiteY0"/>
+              </a:cxn>
+              <a:cxn ang="0">
+                <a:pos x="connsiteX1" y="connsiteY1"/>
+              </a:cxn>
+              <a:cxn ang="0">
+                <a:pos x="connsiteX2" y="connsiteY2"/>
+              </a:cxn>
+              <a:cxn ang="0">
+                <a:pos x="connsiteX3" y="connsiteY3"/>
+              </a:cxn>
+              <a:cxn ang="0">
+                <a:pos x="connsiteX4" y="connsiteY4"/>
+              </a:cxn>
+              <a:cxn ang="0">
+                <a:pos x="connsiteX5" y="connsiteY5"/>
+              </a:cxn>
+              <a:cxn ang="0">
+                <a:pos x="connsiteX6" y="connsiteY6"/>
+              </a:cxn>
+              <a:cxn ang="0">
+                <a:pos x="connsiteX7" y="connsiteY7"/>
+              </a:cxn>
+              <a:cxn ang="0">
+                <a:pos x="connsiteX8" y="connsiteY8"/>
+              </a:cxn>
+              <a:cxn ang="0">
+                <a:pos x="connsiteX9" y="connsiteY9"/>
+              </a:cxn>
+              <a:cxn ang="0">
+                <a:pos x="connsiteX10" y="connsiteY10"/>
+              </a:cxn>
+              <a:cxn ang="0">
+                <a:pos x="connsiteX11" y="connsiteY11"/>
+              </a:cxn>
+              <a:cxn ang="0">
+                <a:pos x="connsiteX12" y="connsiteY12"/>
+              </a:cxn>
+              <a:cxn ang="0">
+                <a:pos x="connsiteX13" y="connsiteY13"/>
+              </a:cxn>
+              <a:cxn ang="0">
+                <a:pos x="connsiteX14" y="connsiteY14"/>
+              </a:cxn>
+              <a:cxn ang="0">
+                <a:pos x="connsiteX15" y="connsiteY15"/>
+              </a:cxn>
+              <a:cxn ang="0">
+                <a:pos x="connsiteX16" y="connsiteY16"/>
+              </a:cxn>
+              <a:cxn ang="0">
+                <a:pos x="connsiteX17" y="connsiteY17"/>
+              </a:cxn>
+              <a:cxn ang="0">
+                <a:pos x="connsiteX18" y="connsiteY18"/>
+              </a:cxn>
+              <a:cxn ang="0">
+                <a:pos x="connsiteX19" y="connsiteY19"/>
+              </a:cxn>
+              <a:cxn ang="0">
+                <a:pos x="connsiteX20" y="connsiteY20"/>
+              </a:cxn>
+            </a:cxnLst>
+            <a:rect l="l" t="t" r="r" b="b"/>
+            <a:pathLst>
+              <a:path w="5671065" h="584775" extrusionOk="0">
+                <a:moveTo>
+                  <a:pt x="0" y="0"/>
+                </a:moveTo>
+                <a:cubicBezTo>
+                  <a:pt x="172188" y="18840"/>
+                  <a:pt x="446932" y="-17548"/>
+                  <a:pt x="573408" y="0"/>
+                </a:cubicBezTo>
+                <a:cubicBezTo>
+                  <a:pt x="699884" y="17548"/>
+                  <a:pt x="927333" y="14355"/>
+                  <a:pt x="1090105" y="0"/>
+                </a:cubicBezTo>
+                <a:cubicBezTo>
+                  <a:pt x="1252877" y="-14355"/>
+                  <a:pt x="1429293" y="13700"/>
+                  <a:pt x="1550091" y="0"/>
+                </a:cubicBezTo>
+                <a:cubicBezTo>
+                  <a:pt x="1670889" y="-13700"/>
+                  <a:pt x="1961431" y="23378"/>
+                  <a:pt x="2180209" y="0"/>
+                </a:cubicBezTo>
+                <a:cubicBezTo>
+                  <a:pt x="2398987" y="-23378"/>
+                  <a:pt x="2759703" y="-9896"/>
+                  <a:pt x="2923749" y="0"/>
+                </a:cubicBezTo>
+                <a:cubicBezTo>
+                  <a:pt x="3087795" y="9896"/>
+                  <a:pt x="3302537" y="-8488"/>
+                  <a:pt x="3553867" y="0"/>
+                </a:cubicBezTo>
+                <a:cubicBezTo>
+                  <a:pt x="3805197" y="8488"/>
+                  <a:pt x="3901079" y="-27579"/>
+                  <a:pt x="4127275" y="0"/>
+                </a:cubicBezTo>
+                <a:cubicBezTo>
+                  <a:pt x="4353471" y="27579"/>
+                  <a:pt x="4499386" y="-34171"/>
+                  <a:pt x="4870815" y="0"/>
+                </a:cubicBezTo>
+                <a:cubicBezTo>
+                  <a:pt x="5242244" y="34171"/>
+                  <a:pt x="5362002" y="-28493"/>
+                  <a:pt x="5671065" y="0"/>
+                </a:cubicBezTo>
+                <a:cubicBezTo>
+                  <a:pt x="5673970" y="242329"/>
+                  <a:pt x="5666756" y="396724"/>
+                  <a:pt x="5671065" y="584775"/>
+                </a:cubicBezTo>
+                <a:cubicBezTo>
+                  <a:pt x="5569933" y="569095"/>
+                  <a:pt x="5354033" y="604519"/>
+                  <a:pt x="5211079" y="584775"/>
+                </a:cubicBezTo>
+                <a:cubicBezTo>
+                  <a:pt x="5068125" y="565031"/>
+                  <a:pt x="4863397" y="558310"/>
+                  <a:pt x="4637671" y="584775"/>
+                </a:cubicBezTo>
+                <a:cubicBezTo>
+                  <a:pt x="4411945" y="611240"/>
+                  <a:pt x="4049973" y="576015"/>
+                  <a:pt x="3894131" y="584775"/>
+                </a:cubicBezTo>
+                <a:cubicBezTo>
+                  <a:pt x="3738289" y="593535"/>
+                  <a:pt x="3480653" y="578061"/>
+                  <a:pt x="3264013" y="584775"/>
+                </a:cubicBezTo>
+                <a:cubicBezTo>
+                  <a:pt x="3047373" y="591489"/>
+                  <a:pt x="2878818" y="559767"/>
+                  <a:pt x="2747316" y="584775"/>
+                </a:cubicBezTo>
+                <a:cubicBezTo>
+                  <a:pt x="2615814" y="609783"/>
+                  <a:pt x="2348530" y="569098"/>
+                  <a:pt x="2060487" y="584775"/>
+                </a:cubicBezTo>
+                <a:cubicBezTo>
+                  <a:pt x="1772444" y="600452"/>
+                  <a:pt x="1671847" y="595230"/>
+                  <a:pt x="1543790" y="584775"/>
+                </a:cubicBezTo>
+                <a:cubicBezTo>
+                  <a:pt x="1415733" y="574320"/>
+                  <a:pt x="1168933" y="557195"/>
+                  <a:pt x="856961" y="584775"/>
+                </a:cubicBezTo>
+                <a:cubicBezTo>
+                  <a:pt x="544989" y="612355"/>
+                  <a:pt x="247224" y="622591"/>
+                  <a:pt x="0" y="584775"/>
+                </a:cubicBezTo>
+                <a:cubicBezTo>
+                  <a:pt x="20094" y="465216"/>
+                  <a:pt x="11161" y="265012"/>
+                  <a:pt x="0" y="0"/>
+                </a:cubicBezTo>
+                <a:close/>
+              </a:path>
+            </a:pathLst>
+          </a:custGeom>
+          <a:noFill/>
+          <a:ln>
+            <a:noFill/>
+            <a:extLst>
+              <a:ext uri="{C807C97D-BFC1-408E-A445-0C87EB9F89A2}">
+                <ask:lineSketchStyleProps xmlns:ask="http://schemas.microsoft.com/office/drawing/2018/sketchyshapes" sd="2835737594">
+                  <a:prstGeom prst="rect">
+                    <a:avLst/>
+                  </a:prstGeom>
+                  <ask:type>
+                    <ask:lineSketchFreehand/>
+                  </ask:type>
+                </ask:lineSketchStyleProps>
+              </a:ext>
+            </a:extLst>
+          </a:ln>
+        </p:spPr>
+        <p:txBody>
+          <a:bodyPr wrap="square" rtlCol="0">
+            <a:spAutoFit/>
+          </a:bodyPr>
+          <a:lstStyle/>
+          <a:p>
+            <a:pPr algn="ctr"/>
+            <a:r>
+              <a:rPr lang="el-GR" sz="3200" b="1" dirty="0">
+                <a:solidFill>
+                  <a:srgbClr val="FDB879"/>
+                </a:solidFill>
+              </a:rPr>
+              <a:t>τ</a:t>
+            </a:r>
+            <a:r>
+              <a:rPr lang="en-US" sz="3200" b="1" dirty="0"/>
+              <a:t> </a:t>
+            </a:r>
+            <a:r>
+              <a:rPr lang="en-US" sz="3200" b="1" dirty="0" err="1"/>
+              <a:t>dV</a:t>
+            </a:r>
+            <a:r>
+              <a:rPr lang="en-US" sz="3200" b="1" dirty="0"/>
+              <a:t>/dt  =  </a:t>
+            </a:r>
+            <a:r>
+              <a:rPr lang="en-US" sz="3200" b="1" dirty="0">
+                <a:solidFill>
+                  <a:srgbClr val="84C777"/>
+                </a:solidFill>
+              </a:rPr>
+              <a:t>– V </a:t>
+            </a:r>
+            <a:r>
+              <a:rPr lang="en-US" sz="3200" b="1" dirty="0"/>
+              <a:t>+ </a:t>
+            </a:r>
+            <a:r>
+              <a:rPr lang="en-US" sz="3200" b="1" dirty="0" err="1"/>
+              <a:t>I</a:t>
+            </a:r>
+            <a:r>
+              <a:rPr lang="en-US" sz="3200" b="1" baseline="-25000" dirty="0" err="1"/>
+              <a:t>external</a:t>
+            </a:r>
+            <a:endParaRPr lang="en-US" sz="3200" b="1" baseline="-25000" dirty="0"/>
+          </a:p>
+        </p:txBody>
+      </p:sp>
+      <p:sp>
+        <p:nvSpPr>
+          <p:cNvPr id="3" name="TextBox 2">
+            <a:extLst>
+              <a:ext uri="{FF2B5EF4-FFF2-40B4-BE49-F238E27FC236}">
+                <a16:creationId xmlns:a16="http://schemas.microsoft.com/office/drawing/2014/main" id="{0E4B8B5A-D537-E7AD-1EBD-8CFAA89AAA16}"/>
+              </a:ext>
+            </a:extLst>
+          </p:cNvPr>
+          <p:cNvSpPr txBox="1"/>
+          <p:nvPr/>
+        </p:nvSpPr>
+        <p:spPr>
+          <a:xfrm>
+            <a:off x="1281669" y="3106964"/>
+            <a:ext cx="3008870" cy="584775"/>
+          </a:xfrm>
+          <a:prstGeom prst="rect">
+            <a:avLst/>
+          </a:prstGeom>
+          <a:noFill/>
+        </p:spPr>
+        <p:txBody>
+          <a:bodyPr wrap="square" rtlCol="0">
+            <a:spAutoFit/>
+          </a:bodyPr>
+          <a:lstStyle/>
+          <a:p>
+            <a:pPr algn="ctr"/>
+            <a:r>
+              <a:rPr lang="en-US" sz="3200" b="1" dirty="0"/>
+              <a:t>r(t)  =  </a:t>
+            </a:r>
+            <a:r>
+              <a:rPr lang="el-GR" sz="3200" b="1" dirty="0"/>
+              <a:t>φ</a:t>
+            </a:r>
+            <a:r>
+              <a:rPr lang="en-US" sz="3200" b="1" dirty="0"/>
+              <a:t>(V(t))</a:t>
+            </a:r>
+            <a:endParaRPr lang="en-US" sz="3200" b="1" baseline="-25000" dirty="0"/>
+          </a:p>
+        </p:txBody>
+      </p:sp>
+      <p:grpSp>
+        <p:nvGrpSpPr>
+          <p:cNvPr id="21" name="Group 20">
+            <a:extLst>
+              <a:ext uri="{FF2B5EF4-FFF2-40B4-BE49-F238E27FC236}">
+                <a16:creationId xmlns:a16="http://schemas.microsoft.com/office/drawing/2014/main" id="{70BA3FAE-ADA4-EB12-2ADF-7B6A637AAE8E}"/>
+              </a:ext>
+            </a:extLst>
+          </p:cNvPr>
+          <p:cNvGrpSpPr/>
+          <p:nvPr/>
+        </p:nvGrpSpPr>
+        <p:grpSpPr>
+          <a:xfrm>
+            <a:off x="0" y="4064570"/>
+            <a:ext cx="4349025" cy="1783673"/>
+            <a:chOff x="0" y="3777246"/>
+            <a:chExt cx="4349025" cy="1783673"/>
+          </a:xfrm>
+        </p:grpSpPr>
+        <p:sp>
+          <p:nvSpPr>
+            <p:cNvPr id="16" name="TextBox 15">
+              <a:extLst>
+                <a:ext uri="{FF2B5EF4-FFF2-40B4-BE49-F238E27FC236}">
+                  <a16:creationId xmlns:a16="http://schemas.microsoft.com/office/drawing/2014/main" id="{4A0DBA8F-1E9F-8EE5-0A82-7D0DD5DA6558}"/>
+                </a:ext>
+              </a:extLst>
+            </p:cNvPr>
+            <p:cNvSpPr txBox="1"/>
+            <p:nvPr/>
+          </p:nvSpPr>
+          <p:spPr>
+            <a:xfrm>
+              <a:off x="0" y="4187748"/>
+              <a:ext cx="3008870" cy="584775"/>
+            </a:xfrm>
+            <a:prstGeom prst="rect">
+              <a:avLst/>
+            </a:prstGeom>
+            <a:noFill/>
+          </p:spPr>
+          <p:txBody>
+            <a:bodyPr wrap="square" rtlCol="0">
+              <a:spAutoFit/>
+            </a:bodyPr>
+            <a:lstStyle/>
+            <a:p>
+              <a:pPr algn="ctr"/>
+              <a:r>
+                <a:rPr lang="en-US" sz="3200" dirty="0"/>
+                <a:t>where </a:t>
+              </a:r>
+              <a:r>
+                <a:rPr lang="el-GR" sz="3200" b="1" dirty="0"/>
+                <a:t>φ</a:t>
+              </a:r>
+              <a:r>
+                <a:rPr lang="en-US" sz="3200" b="1" dirty="0"/>
+                <a:t>(x) = </a:t>
+              </a:r>
+              <a:endParaRPr lang="en-US" sz="3200" baseline="-25000" dirty="0"/>
+            </a:p>
+          </p:txBody>
+        </p:sp>
+        <p:grpSp>
+          <p:nvGrpSpPr>
+            <p:cNvPr id="19" name="Group 18">
+              <a:extLst>
+                <a:ext uri="{FF2B5EF4-FFF2-40B4-BE49-F238E27FC236}">
+                  <a16:creationId xmlns:a16="http://schemas.microsoft.com/office/drawing/2014/main" id="{67C4DF32-0F99-6470-BA01-39A68A754B46}"/>
+                </a:ext>
+              </a:extLst>
+            </p:cNvPr>
+            <p:cNvGrpSpPr/>
+            <p:nvPr/>
+          </p:nvGrpSpPr>
+          <p:grpSpPr>
+            <a:xfrm>
+              <a:off x="2539606" y="3777246"/>
+              <a:ext cx="1809419" cy="1070255"/>
+              <a:chOff x="2539606" y="3777246"/>
+              <a:chExt cx="1809419" cy="1070255"/>
+            </a:xfrm>
+          </p:grpSpPr>
+          <p:sp>
+            <p:nvSpPr>
+              <p:cNvPr id="6" name="TextBox 5">
+                <a:extLst>
+                  <a:ext uri="{FF2B5EF4-FFF2-40B4-BE49-F238E27FC236}">
+                    <a16:creationId xmlns:a16="http://schemas.microsoft.com/office/drawing/2014/main" id="{8DAE340E-1A14-A46D-CC4A-09E037D51FB1}"/>
+                  </a:ext>
+                </a:extLst>
+              </p:cNvPr>
+              <p:cNvSpPr txBox="1"/>
+              <p:nvPr/>
+            </p:nvSpPr>
+            <p:spPr>
+              <a:xfrm>
+                <a:off x="2979192" y="3777246"/>
+                <a:ext cx="914400" cy="584775"/>
+              </a:xfrm>
+              <a:prstGeom prst="rect">
+                <a:avLst/>
+              </a:prstGeom>
+              <a:noFill/>
+            </p:spPr>
+            <p:txBody>
+              <a:bodyPr wrap="square" rtlCol="0">
+                <a:spAutoFit/>
+              </a:bodyPr>
+              <a:lstStyle/>
+              <a:p>
+                <a:pPr algn="ctr"/>
+                <a:r>
+                  <a:rPr lang="en-US" sz="3200" b="1" dirty="0"/>
+                  <a:t>1</a:t>
+                </a:r>
+              </a:p>
+            </p:txBody>
+          </p:sp>
+          <p:cxnSp>
+            <p:nvCxnSpPr>
+              <p:cNvPr id="7" name="Straight Arrow Connector 6">
+                <a:extLst>
+                  <a:ext uri="{FF2B5EF4-FFF2-40B4-BE49-F238E27FC236}">
+                    <a16:creationId xmlns:a16="http://schemas.microsoft.com/office/drawing/2014/main" id="{AF703557-18A5-6152-C415-6E14D6F027B8}"/>
+                  </a:ext>
+                </a:extLst>
+              </p:cNvPr>
+              <p:cNvCxnSpPr>
+                <a:cxnSpLocks/>
+              </p:cNvCxnSpPr>
+              <p:nvPr/>
+            </p:nvCxnSpPr>
+            <p:spPr>
+              <a:xfrm>
+                <a:off x="2883169" y="4275902"/>
+                <a:ext cx="1131160" cy="0"/>
+              </a:xfrm>
+              <a:prstGeom prst="straightConnector1">
+                <a:avLst/>
+              </a:prstGeom>
+              <a:ln w="19050"/>
+            </p:spPr>
+            <p:style>
+              <a:lnRef idx="1">
+                <a:schemeClr val="dk1"/>
+              </a:lnRef>
+              <a:fillRef idx="0">
+                <a:schemeClr val="dk1"/>
+              </a:fillRef>
+              <a:effectRef idx="0">
+                <a:schemeClr val="dk1"/>
+              </a:effectRef>
+              <a:fontRef idx="minor">
+                <a:schemeClr val="tx1"/>
+              </a:fontRef>
+            </p:style>
+          </p:cxnSp>
+          <p:sp>
+            <p:nvSpPr>
+              <p:cNvPr id="18" name="TextBox 17">
+                <a:extLst>
+                  <a:ext uri="{FF2B5EF4-FFF2-40B4-BE49-F238E27FC236}">
+                    <a16:creationId xmlns:a16="http://schemas.microsoft.com/office/drawing/2014/main" id="{DBFAB36F-0A68-164E-EA31-8F8CDBAB4C2F}"/>
+                  </a:ext>
+                </a:extLst>
+              </p:cNvPr>
+              <p:cNvSpPr txBox="1"/>
+              <p:nvPr/>
+            </p:nvSpPr>
+            <p:spPr>
+              <a:xfrm>
+                <a:off x="2539606" y="4262726"/>
+                <a:ext cx="1809419" cy="584775"/>
+              </a:xfrm>
+              <a:prstGeom prst="rect">
+                <a:avLst/>
+              </a:prstGeom>
+              <a:noFill/>
+            </p:spPr>
+            <p:txBody>
+              <a:bodyPr wrap="square" rtlCol="0">
+                <a:spAutoFit/>
+              </a:bodyPr>
+              <a:lstStyle/>
+              <a:p>
+                <a:pPr algn="ctr"/>
+                <a:r>
+                  <a:rPr lang="en-US" sz="3200" b="1" dirty="0"/>
+                  <a:t>1 + e</a:t>
+                </a:r>
+                <a:r>
+                  <a:rPr lang="en-US" sz="3200" b="1" baseline="30000" dirty="0"/>
+                  <a:t>-x</a:t>
+                </a:r>
+                <a:endParaRPr lang="en-US" sz="3200" b="1" dirty="0"/>
+              </a:p>
+            </p:txBody>
+          </p:sp>
+        </p:grpSp>
+        <p:sp>
+          <p:nvSpPr>
+            <p:cNvPr id="20" name="TextBox 19">
+              <a:extLst>
+                <a:ext uri="{FF2B5EF4-FFF2-40B4-BE49-F238E27FC236}">
+                  <a16:creationId xmlns:a16="http://schemas.microsoft.com/office/drawing/2014/main" id="{C5FC41BB-889E-6D6B-A5C9-3D3C2C83D2A3}"/>
+                </a:ext>
+              </a:extLst>
+            </p:cNvPr>
+            <p:cNvSpPr txBox="1"/>
+            <p:nvPr/>
+          </p:nvSpPr>
+          <p:spPr>
+            <a:xfrm>
+              <a:off x="2553410" y="4976144"/>
+              <a:ext cx="1795615" cy="584775"/>
+            </a:xfrm>
+            <a:prstGeom prst="rect">
+              <a:avLst/>
+            </a:prstGeom>
+            <a:noFill/>
+          </p:spPr>
+          <p:txBody>
+            <a:bodyPr wrap="square" rtlCol="0">
+              <a:spAutoFit/>
+            </a:bodyPr>
+            <a:lstStyle/>
+            <a:p>
+              <a:pPr algn="ctr"/>
+              <a:r>
+                <a:rPr lang="en-US" sz="3200" b="1" dirty="0"/>
+                <a:t>tanh(x)</a:t>
+              </a:r>
+            </a:p>
+          </p:txBody>
+        </p:sp>
+      </p:grpSp>
+      <p:grpSp>
+        <p:nvGrpSpPr>
+          <p:cNvPr id="23" name="Group 22">
+            <a:extLst>
+              <a:ext uri="{FF2B5EF4-FFF2-40B4-BE49-F238E27FC236}">
+                <a16:creationId xmlns:a16="http://schemas.microsoft.com/office/drawing/2014/main" id="{20A4C050-7D3F-D7BE-AB0E-FEE8B191FD2A}"/>
+              </a:ext>
+            </a:extLst>
+          </p:cNvPr>
+          <p:cNvGrpSpPr/>
+          <p:nvPr/>
+        </p:nvGrpSpPr>
+        <p:grpSpPr>
+          <a:xfrm>
+            <a:off x="6038215" y="1050943"/>
+            <a:ext cx="6037832" cy="5474549"/>
+            <a:chOff x="6038215" y="450638"/>
+            <a:chExt cx="6037832" cy="5474549"/>
+          </a:xfrm>
+        </p:grpSpPr>
+        <p:pic>
+          <p:nvPicPr>
+            <p:cNvPr id="2050" name="Picture 2" descr="Figure 1. Examples of network activity as a function of s and g. Each inset shows x(t) for 6 out of 400 network units as a function of time, with its location indicating the values g and s used: for insets 1-12 (in order): (g, s) = (0.5,2.5), (1.3,2.5), (2.5,2.5), (0.6,1.5), (1.5,1.5), (2.5,1.5), (0.4,0.4), (1.5,0.5), (2.5,0.5), (0.4,-0.4), (1.2, -0.3), (2.5,-0.5). The long-dashed line is the boundary between activity that decays to 0 (inserts 7, 10 &amp; 11) and persistent chaotic activity (inserts 8, 9 &amp; 12). The solid curve is the boundary between persistent chaos and what we will show to be transient chaotic activity that ultimately converges to one of many nonzero fixed points (inserts 1-6). For inserts 3-6, there is a break in the time axis, reflecting the long time required for convergence to a fixed point. The short-dashed line simply indicates s=1.">
+              <a:extLst>
+                <a:ext uri="{FF2B5EF4-FFF2-40B4-BE49-F238E27FC236}">
+                  <a16:creationId xmlns:a16="http://schemas.microsoft.com/office/drawing/2014/main" id="{16D8960A-C2ED-35A6-753E-98CBECE9EEA1}"/>
+                </a:ext>
+              </a:extLst>
+            </p:cNvPr>
+            <p:cNvPicPr>
+              <a:picLocks noChangeAspect="1" noChangeArrowheads="1"/>
+            </p:cNvPicPr>
+            <p:nvPr/>
+          </p:nvPicPr>
+          <p:blipFill rotWithShape="1">
+            <a:blip r:embed="rId2">
+              <a:extLst>
+                <a:ext uri="{28A0092B-C50C-407E-A947-70E740481C1C}">
+                  <a14:useLocalDpi xmlns:a14="http://schemas.microsoft.com/office/drawing/2010/main" val="0"/>
+                </a:ext>
+              </a:extLst>
+            </a:blip>
+            <a:srcRect b="2724"/>
+            <a:stretch/>
+          </p:blipFill>
+          <p:spPr bwMode="auto">
+            <a:xfrm>
+              <a:off x="6038215" y="966811"/>
+              <a:ext cx="6037832" cy="4519589"/>
+            </a:xfrm>
+            <a:prstGeom prst="rect">
+              <a:avLst/>
+            </a:prstGeom>
+            <a:noFill/>
+            <a:extLst>
+              <a:ext uri="{909E8E84-426E-40DD-AFC4-6F175D3DCCD1}">
+                <a14:hiddenFill xmlns:a14="http://schemas.microsoft.com/office/drawing/2010/main">
+                  <a:solidFill>
+                    <a:srgbClr val="FFFFFF"/>
+                  </a:solidFill>
+                </a14:hiddenFill>
+              </a:ext>
+            </a:extLst>
+          </p:spPr>
+        </p:pic>
+        <p:sp>
+          <p:nvSpPr>
+            <p:cNvPr id="22" name="TextBox 21">
+              <a:extLst>
+                <a:ext uri="{FF2B5EF4-FFF2-40B4-BE49-F238E27FC236}">
+                  <a16:creationId xmlns:a16="http://schemas.microsoft.com/office/drawing/2014/main" id="{BA4EB256-3DD7-32E8-0613-919D13FD5A96}"/>
+                </a:ext>
+              </a:extLst>
+            </p:cNvPr>
+            <p:cNvSpPr txBox="1"/>
+            <p:nvPr/>
+          </p:nvSpPr>
+          <p:spPr>
+            <a:xfrm>
+              <a:off x="6512160" y="5555855"/>
+              <a:ext cx="5467864" cy="369332"/>
+            </a:xfrm>
+            <a:prstGeom prst="rect">
+              <a:avLst/>
+            </a:prstGeom>
+            <a:noFill/>
+          </p:spPr>
+          <p:txBody>
+            <a:bodyPr wrap="square" rtlCol="0">
+              <a:spAutoFit/>
+            </a:bodyPr>
+            <a:lstStyle/>
+            <a:p>
+              <a:pPr algn="r"/>
+              <a:r>
+                <a:rPr lang="en-US" dirty="0"/>
+                <a:t>Stern, </a:t>
+              </a:r>
+              <a:r>
+                <a:rPr lang="en-US" dirty="0" err="1"/>
+                <a:t>Sompolinsky</a:t>
+              </a:r>
+              <a:r>
+                <a:rPr lang="en-US" dirty="0"/>
+                <a:t>, and Abbott (2014) PRE</a:t>
+              </a:r>
+            </a:p>
+          </p:txBody>
+        </p:sp>
+        <p:pic>
+          <p:nvPicPr>
+            <p:cNvPr id="2052" name="Picture 4" descr="It's like sigma summation notation, except instead of summing the argument over all values of i, you 2 the argument over all values of 2.">
+              <a:extLst>
+                <a:ext uri="{FF2B5EF4-FFF2-40B4-BE49-F238E27FC236}">
+                  <a16:creationId xmlns:a16="http://schemas.microsoft.com/office/drawing/2014/main" id="{6B18AB50-A0CB-D68E-0292-377B1667D170}"/>
+                </a:ext>
+              </a:extLst>
+            </p:cNvPr>
+            <p:cNvPicPr>
+              <a:picLocks noChangeAspect="1" noChangeArrowheads="1"/>
+            </p:cNvPicPr>
+            <p:nvPr/>
+          </p:nvPicPr>
+          <p:blipFill rotWithShape="1">
+            <a:blip r:embed="rId3">
+              <a:extLst>
+                <a:ext uri="{28A0092B-C50C-407E-A947-70E740481C1C}">
+                  <a14:useLocalDpi xmlns:a14="http://schemas.microsoft.com/office/drawing/2010/main" val="0"/>
+                </a:ext>
+              </a:extLst>
+            </a:blip>
+            <a:srcRect l="33565" t="82544" r="35620" b="3610"/>
+            <a:stretch/>
+          </p:blipFill>
+          <p:spPr bwMode="auto">
+            <a:xfrm>
+              <a:off x="8628254" y="450638"/>
+              <a:ext cx="1235676" cy="425988"/>
+            </a:xfrm>
+            <a:prstGeom prst="rect">
+              <a:avLst/>
+            </a:prstGeom>
+            <a:noFill/>
+            <a:extLst>
+              <a:ext uri="{909E8E84-426E-40DD-AFC4-6F175D3DCCD1}">
+                <a14:hiddenFill xmlns:a14="http://schemas.microsoft.com/office/drawing/2010/main">
+                  <a:solidFill>
+                    <a:srgbClr val="FFFFFF"/>
+                  </a:solidFill>
+                </a14:hiddenFill>
+              </a:ext>
+            </a:extLst>
+          </p:spPr>
+        </p:pic>
+      </p:grpSp>
+    </p:spTree>
+    <p:extLst>
+      <p:ext uri="{BB962C8B-B14F-4D97-AF65-F5344CB8AC3E}">
+        <p14:creationId xmlns:p14="http://schemas.microsoft.com/office/powerpoint/2010/main" val="3108576389"/>
+      </p:ext>
+    </p:extLst>
+  </p:cSld>
+  <p:clrMapOvr>
+    <a:masterClrMapping/>
+  </p:clrMapOvr>
+  <p:timing>
+    <p:tnLst>
+      <p:par>
+        <p:cTn id="1" dur="indefinite" restart="never" nodeType="tmRoot">
+          <p:childTnLst>
+            <p:seq concurrent="1" nextAc="seek">
+              <p:cTn id="2" dur="indefinite" nodeType="mainSeq">
+                <p:childTnLst>
+                  <p:par>
+                    <p:cTn id="3" fill="hold">
+                      <p:stCondLst>
+                        <p:cond delay="indefinite"/>
+                      </p:stCondLst>
+                      <p:childTnLst>
+                        <p:par>
+                          <p:cTn id="4" fill="hold">
+                            <p:stCondLst>
+                              <p:cond delay="0"/>
+                            </p:stCondLst>
+                            <p:childTnLst>
+                              <p:par>
+                                <p:cTn id="5" presetID="10" presetClass="entr" presetSubtype="0" fill="hold" grpId="0" nodeType="clickEffect">
+                                  <p:stCondLst>
+                                    <p:cond delay="0"/>
+                                  </p:stCondLst>
+                                  <p:childTnLst>
+                                    <p:set>
+                                      <p:cBhvr>
+                                        <p:cTn id="6" dur="1" fill="hold">
+                                          <p:stCondLst>
+                                            <p:cond delay="0"/>
+                                          </p:stCondLst>
+                                        </p:cTn>
+                                        <p:tgtEl>
+                                          <p:spTgt spid="3"/>
+                                        </p:tgtEl>
+                                        <p:attrNameLst>
+                                          <p:attrName>style.visibility</p:attrName>
+                                        </p:attrNameLst>
+                                      </p:cBhvr>
+                                      <p:to>
+                                        <p:strVal val="visible"/>
+                                      </p:to>
+                                    </p:set>
+                                    <p:animEffect transition="in" filter="fade">
+                                      <p:cBhvr>
+                                        <p:cTn id="7" dur="100"/>
+                                        <p:tgtEl>
+                                          <p:spTgt spid="3"/>
+                                        </p:tgtEl>
+                                      </p:cBhvr>
+                                    </p:animEffect>
+                                  </p:childTnLst>
+                                </p:cTn>
+                              </p:par>
+                            </p:childTnLst>
+                          </p:cTn>
+                        </p:par>
+                      </p:childTnLst>
+                    </p:cTn>
+                  </p:par>
+                  <p:par>
+                    <p:cTn id="8" fill="hold">
+                      <p:stCondLst>
+                        <p:cond delay="indefinite"/>
+                      </p:stCondLst>
+                      <p:childTnLst>
+                        <p:par>
+                          <p:cTn id="9" fill="hold">
+                            <p:stCondLst>
+                              <p:cond delay="0"/>
+                            </p:stCondLst>
+                            <p:childTnLst>
+                              <p:par>
+                                <p:cTn id="10" presetID="10" presetClass="entr" presetSubtype="0" fill="hold" nodeType="clickEffect">
+                                  <p:stCondLst>
+                                    <p:cond delay="0"/>
+                                  </p:stCondLst>
+                                  <p:childTnLst>
+                                    <p:set>
+                                      <p:cBhvr>
+                                        <p:cTn id="11" dur="1" fill="hold">
+                                          <p:stCondLst>
+                                            <p:cond delay="0"/>
+                                          </p:stCondLst>
+                                        </p:cTn>
+                                        <p:tgtEl>
+                                          <p:spTgt spid="21"/>
+                                        </p:tgtEl>
+                                        <p:attrNameLst>
+                                          <p:attrName>style.visibility</p:attrName>
+                                        </p:attrNameLst>
+                                      </p:cBhvr>
+                                      <p:to>
+                                        <p:strVal val="visible"/>
+                                      </p:to>
+                                    </p:set>
+                                    <p:animEffect transition="in" filter="fade">
+                                      <p:cBhvr>
+                                        <p:cTn id="12" dur="100"/>
+                                        <p:tgtEl>
+                                          <p:spTgt spid="21"/>
+                                        </p:tgtEl>
+                                      </p:cBhvr>
+                                    </p:animEffect>
+                                  </p:childTnLst>
+                                </p:cTn>
+                              </p:par>
+                            </p:childTnLst>
+                          </p:cTn>
+                        </p:par>
+                      </p:childTnLst>
+                    </p:cTn>
+                  </p:par>
+                  <p:par>
+                    <p:cTn id="13" fill="hold">
+                      <p:stCondLst>
+                        <p:cond delay="indefinite"/>
+                      </p:stCondLst>
+                      <p:childTnLst>
+                        <p:par>
+                          <p:cTn id="14" fill="hold">
+                            <p:stCondLst>
+                              <p:cond delay="0"/>
+                            </p:stCondLst>
+                            <p:childTnLst>
+                              <p:par>
+                                <p:cTn id="15" presetID="10" presetClass="entr" presetSubtype="0" fill="hold" nodeType="clickEffect">
+                                  <p:stCondLst>
+                                    <p:cond delay="0"/>
+                                  </p:stCondLst>
+                                  <p:childTnLst>
+                                    <p:set>
+                                      <p:cBhvr>
+                                        <p:cTn id="16" dur="1" fill="hold">
+                                          <p:stCondLst>
+                                            <p:cond delay="0"/>
+                                          </p:stCondLst>
+                                        </p:cTn>
+                                        <p:tgtEl>
+                                          <p:spTgt spid="23"/>
+                                        </p:tgtEl>
+                                        <p:attrNameLst>
+                                          <p:attrName>style.visibility</p:attrName>
+                                        </p:attrNameLst>
+                                      </p:cBhvr>
+                                      <p:to>
+                                        <p:strVal val="visible"/>
+                                      </p:to>
+                                    </p:set>
+                                    <p:animEffect transition="in" filter="fade">
+                                      <p:cBhvr>
+                                        <p:cTn id="17" dur="100"/>
+                                        <p:tgtEl>
+                                          <p:spTgt spid="23"/>
+                                        </p:tgtEl>
+                                      </p:cBhvr>
+                                    </p:animEffect>
+                                  </p:childTnLst>
+                                </p:cTn>
+                              </p:par>
+                            </p:childTnLst>
+                          </p:cTn>
+                        </p:par>
+                      </p:childTnLst>
+                    </p:cTn>
+                  </p:par>
+                </p:childTnLst>
+              </p:cTn>
+              <p:prevCondLst>
+                <p:cond evt="onPrev" delay="0">
+                  <p:tgtEl>
+                    <p:sldTgt/>
+                  </p:tgtEl>
+                </p:cond>
+              </p:prevCondLst>
+              <p:nextCondLst>
+                <p:cond evt="onNext" delay="0">
+                  <p:tgtEl>
+                    <p:sldTgt/>
+                  </p:tgtEl>
+                </p:cond>
+              </p:nextCondLst>
+            </p:seq>
+          </p:childTnLst>
+        </p:cTn>
+      </p:par>
+    </p:tnLst>
+    <p:bldLst>
+      <p:bldP spid="3" grpId="0"/>
+    </p:bldLst>
+  </p:timing>
+</p:sld>
+</file>
+
+<file path=ppt/slides/slide21.xml><?xml version="1.0" encoding="utf-8"?>
+<p:sld xmlns:a="http://schemas.openxmlformats.org/drawingml/2006/main" xmlns:r="http://schemas.openxmlformats.org/officeDocument/2006/relationships" xmlns:p="http://schemas.openxmlformats.org/presentationml/2006/main">
+  <p:cSld>
+    <p:spTree>
+      <p:nvGrpSpPr>
+        <p:cNvPr id="1" name=""/>
+        <p:cNvGrpSpPr/>
+        <p:nvPr/>
+      </p:nvGrpSpPr>
+      <p:grpSpPr>
+        <a:xfrm>
+          <a:off x="0" y="0"/>
+          <a:ext cx="0" cy="0"/>
+          <a:chOff x="0" y="0"/>
+          <a:chExt cx="0" cy="0"/>
+        </a:xfrm>
+      </p:grpSpPr>
+      <p:sp>
+        <p:nvSpPr>
           <p:cNvPr id="25" name="TextBox 24">
             <a:extLst>
               <a:ext uri="{FF2B5EF4-FFF2-40B4-BE49-F238E27FC236}">
@@ -19360,7 +19512,7 @@
 </p:sld>
 </file>
 
-<file path=ppt/slides/slide21.xml><?xml version="1.0" encoding="utf-8"?>
+<file path=ppt/slides/slide22.xml><?xml version="1.0" encoding="utf-8"?>
 <p:sld xmlns:a="http://schemas.openxmlformats.org/drawingml/2006/main" xmlns:r="http://schemas.openxmlformats.org/officeDocument/2006/relationships" xmlns:p="http://schemas.openxmlformats.org/presentationml/2006/main">
   <p:cSld>
     <p:spTree>
@@ -21621,7 +21773,7 @@
 </p:sld>
 </file>
 
-<file path=ppt/slides/slide22.xml><?xml version="1.0" encoding="utf-8"?>
+<file path=ppt/slides/slide23.xml><?xml version="1.0" encoding="utf-8"?>
 <p:sld xmlns:a="http://schemas.openxmlformats.org/drawingml/2006/main" xmlns:r="http://schemas.openxmlformats.org/officeDocument/2006/relationships" xmlns:p="http://schemas.openxmlformats.org/presentationml/2006/main">
   <p:cSld>
     <p:spTree>
@@ -22411,7 +22563,7 @@
 </p:sld>
 </file>
 
-<file path=ppt/slides/slide23.xml><?xml version="1.0" encoding="utf-8"?>
+<file path=ppt/slides/slide24.xml><?xml version="1.0" encoding="utf-8"?>
 <p:sld xmlns:a="http://schemas.openxmlformats.org/drawingml/2006/main" xmlns:r="http://schemas.openxmlformats.org/officeDocument/2006/relationships" xmlns:p="http://schemas.openxmlformats.org/presentationml/2006/main">
   <p:cSld>
     <p:spTree>
@@ -23211,7 +23363,7 @@
 </p:sld>
 </file>
 
-<file path=ppt/slides/slide24.xml><?xml version="1.0" encoding="utf-8"?>
+<file path=ppt/slides/slide25.xml><?xml version="1.0" encoding="utf-8"?>
 <p:sld xmlns:a="http://schemas.openxmlformats.org/drawingml/2006/main" xmlns:r="http://schemas.openxmlformats.org/officeDocument/2006/relationships" xmlns:p="http://schemas.openxmlformats.org/presentationml/2006/main">
   <p:cSld>
     <p:spTree>

</xml_diff>